<commit_message>
Pretesting V 0.68-B68 - Add New HudBar Placement 'TopStacked' where Label and Value are stacked instead of lined up - Add per profile Background image - Add per profile Padding (Border) around the HudBar window - Add per profile definition of Colors and Fonts - Update Improve aircraft properties via LVARs incl. B787, B747, Fenix A320 V2 and others - Update ColorPicker in Config with custom dialog - Update Trim values get a warning background if >90% or <-90%
</commit_message>
<xml_diff>
--- a/doc/MSFS-CamImage etc.pptx
+++ b/doc/MSFS-CamImage etc.pptx
@@ -8,6 +8,9 @@
     <p:sldId id="260" r:id="rId2"/>
     <p:sldId id="259" r:id="rId3"/>
     <p:sldId id="256" r:id="rId4"/>
+    <p:sldId id="261" r:id="rId5"/>
+    <p:sldId id="262" r:id="rId6"/>
+    <p:sldId id="263" r:id="rId7"/>
   </p:sldIdLst>
   <p:sldSz cx="12192000" cy="6858000"/>
   <p:notesSz cx="6858000" cy="9144000"/>
@@ -256,7 +259,7 @@
           <a:p>
             <a:fld id="{69BAE681-60E4-48A5-B7C1-E573E0E5AE9B}" type="datetimeFigureOut">
               <a:rPr lang="de-CH" smtClean="0"/>
-              <a:t>04.09.2023</a:t>
+              <a:t>23.02.2024</a:t>
             </a:fld>
             <a:endParaRPr lang="de-CH"/>
           </a:p>
@@ -426,7 +429,7 @@
           <a:p>
             <a:fld id="{69BAE681-60E4-48A5-B7C1-E573E0E5AE9B}" type="datetimeFigureOut">
               <a:rPr lang="de-CH" smtClean="0"/>
-              <a:t>04.09.2023</a:t>
+              <a:t>23.02.2024</a:t>
             </a:fld>
             <a:endParaRPr lang="de-CH"/>
           </a:p>
@@ -606,7 +609,7 @@
           <a:p>
             <a:fld id="{69BAE681-60E4-48A5-B7C1-E573E0E5AE9B}" type="datetimeFigureOut">
               <a:rPr lang="de-CH" smtClean="0"/>
-              <a:t>04.09.2023</a:t>
+              <a:t>23.02.2024</a:t>
             </a:fld>
             <a:endParaRPr lang="de-CH"/>
           </a:p>
@@ -776,7 +779,7 @@
           <a:p>
             <a:fld id="{69BAE681-60E4-48A5-B7C1-E573E0E5AE9B}" type="datetimeFigureOut">
               <a:rPr lang="de-CH" smtClean="0"/>
-              <a:t>04.09.2023</a:t>
+              <a:t>23.02.2024</a:t>
             </a:fld>
             <a:endParaRPr lang="de-CH"/>
           </a:p>
@@ -1022,7 +1025,7 @@
           <a:p>
             <a:fld id="{69BAE681-60E4-48A5-B7C1-E573E0E5AE9B}" type="datetimeFigureOut">
               <a:rPr lang="de-CH" smtClean="0"/>
-              <a:t>04.09.2023</a:t>
+              <a:t>23.02.2024</a:t>
             </a:fld>
             <a:endParaRPr lang="de-CH"/>
           </a:p>
@@ -1254,7 +1257,7 @@
           <a:p>
             <a:fld id="{69BAE681-60E4-48A5-B7C1-E573E0E5AE9B}" type="datetimeFigureOut">
               <a:rPr lang="de-CH" smtClean="0"/>
-              <a:t>04.09.2023</a:t>
+              <a:t>23.02.2024</a:t>
             </a:fld>
             <a:endParaRPr lang="de-CH"/>
           </a:p>
@@ -1621,7 +1624,7 @@
           <a:p>
             <a:fld id="{69BAE681-60E4-48A5-B7C1-E573E0E5AE9B}" type="datetimeFigureOut">
               <a:rPr lang="de-CH" smtClean="0"/>
-              <a:t>04.09.2023</a:t>
+              <a:t>23.02.2024</a:t>
             </a:fld>
             <a:endParaRPr lang="de-CH"/>
           </a:p>
@@ -1739,7 +1742,7 @@
           <a:p>
             <a:fld id="{69BAE681-60E4-48A5-B7C1-E573E0E5AE9B}" type="datetimeFigureOut">
               <a:rPr lang="de-CH" smtClean="0"/>
-              <a:t>04.09.2023</a:t>
+              <a:t>23.02.2024</a:t>
             </a:fld>
             <a:endParaRPr lang="de-CH"/>
           </a:p>
@@ -1834,7 +1837,7 @@
           <a:p>
             <a:fld id="{69BAE681-60E4-48A5-B7C1-E573E0E5AE9B}" type="datetimeFigureOut">
               <a:rPr lang="de-CH" smtClean="0"/>
-              <a:t>04.09.2023</a:t>
+              <a:t>23.02.2024</a:t>
             </a:fld>
             <a:endParaRPr lang="de-CH"/>
           </a:p>
@@ -2111,7 +2114,7 @@
           <a:p>
             <a:fld id="{69BAE681-60E4-48A5-B7C1-E573E0E5AE9B}" type="datetimeFigureOut">
               <a:rPr lang="de-CH" smtClean="0"/>
-              <a:t>04.09.2023</a:t>
+              <a:t>23.02.2024</a:t>
             </a:fld>
             <a:endParaRPr lang="de-CH"/>
           </a:p>
@@ -2364,7 +2367,7 @@
           <a:p>
             <a:fld id="{69BAE681-60E4-48A5-B7C1-E573E0E5AE9B}" type="datetimeFigureOut">
               <a:rPr lang="de-CH" smtClean="0"/>
-              <a:t>04.09.2023</a:t>
+              <a:t>23.02.2024</a:t>
             </a:fld>
             <a:endParaRPr lang="de-CH"/>
           </a:p>
@@ -2577,7 +2580,7 @@
           <a:p>
             <a:fld id="{69BAE681-60E4-48A5-B7C1-E573E0E5AE9B}" type="datetimeFigureOut">
               <a:rPr lang="de-CH" smtClean="0"/>
-              <a:t>04.09.2023</a:t>
+              <a:t>23.02.2024</a:t>
             </a:fld>
             <a:endParaRPr lang="de-CH"/>
           </a:p>
@@ -6699,6 +6702,3229 @@
 </p:sld>
 </file>
 
+<file path=ppt/slides/slide4.xml><?xml version="1.0" encoding="utf-8"?>
+<p:sld xmlns:a="http://schemas.openxmlformats.org/drawingml/2006/main" xmlns:r="http://schemas.openxmlformats.org/officeDocument/2006/relationships" xmlns:p="http://schemas.openxmlformats.org/presentationml/2006/main">
+  <p:cSld>
+    <p:spTree>
+      <p:nvGrpSpPr>
+        <p:cNvPr id="1" name=""/>
+        <p:cNvGrpSpPr/>
+        <p:nvPr/>
+      </p:nvGrpSpPr>
+      <p:grpSpPr>
+        <a:xfrm>
+          <a:off x="0" y="0"/>
+          <a:ext cx="0" cy="0"/>
+          <a:chOff x="0" y="0"/>
+          <a:chExt cx="0" cy="0"/>
+        </a:xfrm>
+      </p:grpSpPr>
+      <p:sp>
+        <p:nvSpPr>
+          <p:cNvPr id="2" name="Abgerundetes Rechteck 1"/>
+          <p:cNvSpPr/>
+          <p:nvPr/>
+        </p:nvSpPr>
+        <p:spPr>
+          <a:xfrm>
+            <a:off x="2497723" y="1417627"/>
+            <a:ext cx="5860752" cy="4007404"/>
+          </a:xfrm>
+          <a:prstGeom prst="roundRect">
+            <a:avLst>
+              <a:gd name="adj" fmla="val 1200"/>
+            </a:avLst>
+          </a:prstGeom>
+          <a:ln w="38100"/>
+        </p:spPr>
+        <p:style>
+          <a:lnRef idx="2">
+            <a:schemeClr val="accent1"/>
+          </a:lnRef>
+          <a:fillRef idx="1">
+            <a:schemeClr val="lt1"/>
+          </a:fillRef>
+          <a:effectRef idx="0">
+            <a:schemeClr val="accent1"/>
+          </a:effectRef>
+          <a:fontRef idx="minor">
+            <a:schemeClr val="dk1"/>
+          </a:fontRef>
+        </p:style>
+        <p:txBody>
+          <a:bodyPr rtlCol="0" anchor="ctr"/>
+          <a:lstStyle/>
+          <a:p>
+            <a:pPr algn="ctr"/>
+            <a:endParaRPr lang="de-CH"/>
+          </a:p>
+        </p:txBody>
+      </p:sp>
+      <p:sp>
+        <p:nvSpPr>
+          <p:cNvPr id="3" name="Rechteck 2"/>
+          <p:cNvSpPr/>
+          <p:nvPr/>
+        </p:nvSpPr>
+        <p:spPr>
+          <a:xfrm>
+            <a:off x="2497723" y="1417627"/>
+            <a:ext cx="5860752" cy="386626"/>
+          </a:xfrm>
+          <a:prstGeom prst="rect">
+            <a:avLst/>
+          </a:prstGeom>
+        </p:spPr>
+        <p:style>
+          <a:lnRef idx="2">
+            <a:schemeClr val="accent3">
+              <a:shade val="50000"/>
+            </a:schemeClr>
+          </a:lnRef>
+          <a:fillRef idx="1">
+            <a:schemeClr val="accent3"/>
+          </a:fillRef>
+          <a:effectRef idx="0">
+            <a:schemeClr val="accent3"/>
+          </a:effectRef>
+          <a:fontRef idx="minor">
+            <a:schemeClr val="lt1"/>
+          </a:fontRef>
+        </p:style>
+        <p:txBody>
+          <a:bodyPr rtlCol="0" anchor="ctr"/>
+          <a:lstStyle/>
+          <a:p>
+            <a:pPr algn="ctr"/>
+            <a:r>
+              <a:rPr lang="de-CH" dirty="0" smtClean="0"/>
+              <a:t>BAR</a:t>
+            </a:r>
+            <a:endParaRPr lang="de-CH" dirty="0"/>
+          </a:p>
+        </p:txBody>
+      </p:sp>
+      <p:sp>
+        <p:nvSpPr>
+          <p:cNvPr id="4" name="Rechteck 3"/>
+          <p:cNvSpPr/>
+          <p:nvPr/>
+        </p:nvSpPr>
+        <p:spPr>
+          <a:xfrm>
+            <a:off x="3951148" y="5038405"/>
+            <a:ext cx="3253588" cy="386626"/>
+          </a:xfrm>
+          <a:prstGeom prst="rect">
+            <a:avLst/>
+          </a:prstGeom>
+        </p:spPr>
+        <p:style>
+          <a:lnRef idx="2">
+            <a:schemeClr val="accent3">
+              <a:shade val="50000"/>
+            </a:schemeClr>
+          </a:lnRef>
+          <a:fillRef idx="1">
+            <a:schemeClr val="accent3"/>
+          </a:fillRef>
+          <a:effectRef idx="0">
+            <a:schemeClr val="accent3"/>
+          </a:effectRef>
+          <a:fontRef idx="minor">
+            <a:schemeClr val="lt1"/>
+          </a:fontRef>
+        </p:style>
+        <p:txBody>
+          <a:bodyPr rtlCol="0" anchor="ctr"/>
+          <a:lstStyle/>
+          <a:p>
+            <a:pPr algn="ctr"/>
+            <a:r>
+              <a:rPr lang="de-CH" dirty="0" smtClean="0"/>
+              <a:t>TILE</a:t>
+            </a:r>
+            <a:endParaRPr lang="de-CH" dirty="0"/>
+          </a:p>
+        </p:txBody>
+      </p:sp>
+      <p:grpSp>
+        <p:nvGrpSpPr>
+          <p:cNvPr id="7" name="Gruppieren 6"/>
+          <p:cNvGrpSpPr/>
+          <p:nvPr/>
+        </p:nvGrpSpPr>
+        <p:grpSpPr>
+          <a:xfrm>
+            <a:off x="3174828" y="2028810"/>
+            <a:ext cx="2988678" cy="1555706"/>
+            <a:chOff x="2456809" y="2304413"/>
+            <a:chExt cx="2988678" cy="1555706"/>
+          </a:xfrm>
+        </p:grpSpPr>
+        <p:sp>
+          <p:nvSpPr>
+            <p:cNvPr id="5" name="Rechteck 4"/>
+            <p:cNvSpPr/>
+            <p:nvPr/>
+          </p:nvSpPr>
+          <p:spPr>
+            <a:xfrm>
+              <a:off x="2456809" y="2479314"/>
+              <a:ext cx="2988678" cy="1380805"/>
+            </a:xfrm>
+            <a:prstGeom prst="rect">
+              <a:avLst/>
+            </a:prstGeom>
+          </p:spPr>
+          <p:style>
+            <a:lnRef idx="2">
+              <a:schemeClr val="accent3">
+                <a:shade val="50000"/>
+              </a:schemeClr>
+            </a:lnRef>
+            <a:fillRef idx="1">
+              <a:schemeClr val="accent3"/>
+            </a:fillRef>
+            <a:effectRef idx="0">
+              <a:schemeClr val="accent3"/>
+            </a:effectRef>
+            <a:fontRef idx="minor">
+              <a:schemeClr val="lt1"/>
+            </a:fontRef>
+          </p:style>
+          <p:txBody>
+            <a:bodyPr rtlCol="0" anchor="ctr"/>
+            <a:lstStyle/>
+            <a:p>
+              <a:pPr algn="ctr"/>
+              <a:r>
+                <a:rPr lang="de-CH" dirty="0" smtClean="0"/>
+                <a:t>WINDOW</a:t>
+              </a:r>
+              <a:endParaRPr lang="de-CH" dirty="0"/>
+            </a:p>
+          </p:txBody>
+        </p:sp>
+        <p:sp>
+          <p:nvSpPr>
+            <p:cNvPr id="6" name="Rechteck 5"/>
+            <p:cNvSpPr/>
+            <p:nvPr/>
+          </p:nvSpPr>
+          <p:spPr>
+            <a:xfrm>
+              <a:off x="2456809" y="2304413"/>
+              <a:ext cx="2988678" cy="162626"/>
+            </a:xfrm>
+            <a:prstGeom prst="rect">
+              <a:avLst/>
+            </a:prstGeom>
+          </p:spPr>
+          <p:style>
+            <a:lnRef idx="1">
+              <a:schemeClr val="accent3"/>
+            </a:lnRef>
+            <a:fillRef idx="2">
+              <a:schemeClr val="accent3"/>
+            </a:fillRef>
+            <a:effectRef idx="1">
+              <a:schemeClr val="accent3"/>
+            </a:effectRef>
+            <a:fontRef idx="minor">
+              <a:schemeClr val="dk1"/>
+            </a:fontRef>
+          </p:style>
+          <p:txBody>
+            <a:bodyPr rtlCol="0" anchor="ctr"/>
+            <a:lstStyle/>
+            <a:p>
+              <a:pPr algn="ctr"/>
+              <a:endParaRPr lang="de-CH" dirty="0"/>
+            </a:p>
+          </p:txBody>
+        </p:sp>
+      </p:grpSp>
+      <p:sp>
+        <p:nvSpPr>
+          <p:cNvPr id="9" name="Rechteck 8"/>
+          <p:cNvSpPr/>
+          <p:nvPr/>
+        </p:nvSpPr>
+        <p:spPr>
+          <a:xfrm>
+            <a:off x="6067274" y="3311979"/>
+            <a:ext cx="1970461" cy="1227383"/>
+          </a:xfrm>
+          <a:prstGeom prst="rect">
+            <a:avLst/>
+          </a:prstGeom>
+        </p:spPr>
+        <p:style>
+          <a:lnRef idx="2">
+            <a:schemeClr val="accent3">
+              <a:shade val="50000"/>
+            </a:schemeClr>
+          </a:lnRef>
+          <a:fillRef idx="1">
+            <a:schemeClr val="accent3"/>
+          </a:fillRef>
+          <a:effectRef idx="0">
+            <a:schemeClr val="accent3"/>
+          </a:effectRef>
+          <a:fontRef idx="minor">
+            <a:schemeClr val="lt1"/>
+          </a:fontRef>
+        </p:style>
+        <p:txBody>
+          <a:bodyPr rtlCol="0" anchor="ctr"/>
+          <a:lstStyle/>
+          <a:p>
+            <a:pPr algn="ctr"/>
+            <a:r>
+              <a:rPr lang="de-CH" dirty="0" smtClean="0"/>
+              <a:t>BORDERLESS</a:t>
+            </a:r>
+          </a:p>
+          <a:p>
+            <a:pPr algn="ctr"/>
+            <a:r>
+              <a:rPr lang="de-CH" dirty="0" smtClean="0"/>
+              <a:t>WINDOW</a:t>
+            </a:r>
+            <a:endParaRPr lang="de-CH" dirty="0"/>
+          </a:p>
+        </p:txBody>
+      </p:sp>
+      <p:sp>
+        <p:nvSpPr>
+          <p:cNvPr id="11" name="Textfeld 10"/>
+          <p:cNvSpPr txBox="1"/>
+          <p:nvPr/>
+        </p:nvSpPr>
+        <p:spPr>
+          <a:xfrm>
+            <a:off x="5098098" y="1076472"/>
+            <a:ext cx="561244" cy="369332"/>
+          </a:xfrm>
+          <a:prstGeom prst="rect">
+            <a:avLst/>
+          </a:prstGeom>
+          <a:noFill/>
+        </p:spPr>
+        <p:txBody>
+          <a:bodyPr wrap="none" rtlCol="0">
+            <a:spAutoFit/>
+          </a:bodyPr>
+          <a:lstStyle/>
+          <a:p>
+            <a:r>
+              <a:rPr lang="de-CH" dirty="0" smtClean="0"/>
+              <a:t>TOP</a:t>
+            </a:r>
+            <a:endParaRPr lang="de-CH" dirty="0"/>
+          </a:p>
+        </p:txBody>
+      </p:sp>
+      <p:sp>
+        <p:nvSpPr>
+          <p:cNvPr id="12" name="Textfeld 11"/>
+          <p:cNvSpPr txBox="1"/>
+          <p:nvPr/>
+        </p:nvSpPr>
+        <p:spPr>
+          <a:xfrm>
+            <a:off x="4914977" y="5396854"/>
+            <a:ext cx="1026243" cy="369332"/>
+          </a:xfrm>
+          <a:prstGeom prst="rect">
+            <a:avLst/>
+          </a:prstGeom>
+          <a:noFill/>
+        </p:spPr>
+        <p:txBody>
+          <a:bodyPr wrap="none" rtlCol="0">
+            <a:spAutoFit/>
+          </a:bodyPr>
+          <a:lstStyle/>
+          <a:p>
+            <a:r>
+              <a:rPr lang="de-CH" dirty="0" smtClean="0"/>
+              <a:t>BOTTOM</a:t>
+            </a:r>
+            <a:endParaRPr lang="de-CH" dirty="0"/>
+          </a:p>
+        </p:txBody>
+      </p:sp>
+      <p:sp>
+        <p:nvSpPr>
+          <p:cNvPr id="13" name="Textfeld 12"/>
+          <p:cNvSpPr txBox="1"/>
+          <p:nvPr/>
+        </p:nvSpPr>
+        <p:spPr>
+          <a:xfrm>
+            <a:off x="2200847" y="2821163"/>
+            <a:ext cx="296876" cy="1200329"/>
+          </a:xfrm>
+          <a:prstGeom prst="rect">
+            <a:avLst/>
+          </a:prstGeom>
+          <a:noFill/>
+        </p:spPr>
+        <p:txBody>
+          <a:bodyPr wrap="none" rtlCol="0">
+            <a:spAutoFit/>
+          </a:bodyPr>
+          <a:lstStyle/>
+          <a:p>
+            <a:pPr algn="ctr"/>
+            <a:r>
+              <a:rPr lang="de-CH" dirty="0" smtClean="0"/>
+              <a:t>L</a:t>
+            </a:r>
+          </a:p>
+          <a:p>
+            <a:pPr algn="ctr"/>
+            <a:r>
+              <a:rPr lang="de-CH" dirty="0" smtClean="0"/>
+              <a:t>E</a:t>
+            </a:r>
+          </a:p>
+          <a:p>
+            <a:pPr algn="ctr"/>
+            <a:r>
+              <a:rPr lang="de-CH" dirty="0" smtClean="0"/>
+              <a:t>F</a:t>
+            </a:r>
+          </a:p>
+          <a:p>
+            <a:pPr algn="ctr"/>
+            <a:r>
+              <a:rPr lang="de-CH" dirty="0" smtClean="0"/>
+              <a:t>T</a:t>
+            </a:r>
+            <a:endParaRPr lang="de-CH" dirty="0"/>
+          </a:p>
+        </p:txBody>
+      </p:sp>
+      <p:sp>
+        <p:nvSpPr>
+          <p:cNvPr id="14" name="Textfeld 13"/>
+          <p:cNvSpPr txBox="1"/>
+          <p:nvPr/>
+        </p:nvSpPr>
+        <p:spPr>
+          <a:xfrm>
+            <a:off x="8353872" y="2682664"/>
+            <a:ext cx="330540" cy="1477328"/>
+          </a:xfrm>
+          <a:prstGeom prst="rect">
+            <a:avLst/>
+          </a:prstGeom>
+          <a:noFill/>
+        </p:spPr>
+        <p:txBody>
+          <a:bodyPr wrap="none" rtlCol="0">
+            <a:spAutoFit/>
+          </a:bodyPr>
+          <a:lstStyle/>
+          <a:p>
+            <a:pPr algn="ctr"/>
+            <a:r>
+              <a:rPr lang="de-CH" dirty="0" smtClean="0"/>
+              <a:t>R</a:t>
+            </a:r>
+          </a:p>
+          <a:p>
+            <a:pPr algn="ctr"/>
+            <a:r>
+              <a:rPr lang="de-CH" dirty="0" smtClean="0"/>
+              <a:t>I</a:t>
+            </a:r>
+          </a:p>
+          <a:p>
+            <a:pPr algn="ctr"/>
+            <a:r>
+              <a:rPr lang="de-CH" dirty="0" smtClean="0"/>
+              <a:t>G</a:t>
+            </a:r>
+            <a:endParaRPr lang="de-CH" u="sng" dirty="0" smtClean="0"/>
+          </a:p>
+          <a:p>
+            <a:pPr algn="ctr"/>
+            <a:r>
+              <a:rPr lang="de-CH" dirty="0" smtClean="0"/>
+              <a:t>H</a:t>
+            </a:r>
+          </a:p>
+          <a:p>
+            <a:pPr algn="ctr"/>
+            <a:r>
+              <a:rPr lang="de-CH" dirty="0" smtClean="0"/>
+              <a:t>T</a:t>
+            </a:r>
+            <a:endParaRPr lang="de-CH" dirty="0"/>
+          </a:p>
+        </p:txBody>
+      </p:sp>
+      <p:sp>
+        <p:nvSpPr>
+          <p:cNvPr id="15" name="Rechteck 14"/>
+          <p:cNvSpPr/>
+          <p:nvPr/>
+        </p:nvSpPr>
+        <p:spPr>
+          <a:xfrm>
+            <a:off x="2154057" y="1076472"/>
+            <a:ext cx="6530356" cy="4735184"/>
+          </a:xfrm>
+          <a:prstGeom prst="rect">
+            <a:avLst/>
+          </a:prstGeom>
+          <a:noFill/>
+          <a:ln>
+            <a:solidFill>
+              <a:schemeClr val="accent6">
+                <a:lumMod val="20000"/>
+                <a:lumOff val="80000"/>
+              </a:schemeClr>
+            </a:solidFill>
+          </a:ln>
+        </p:spPr>
+        <p:style>
+          <a:lnRef idx="2">
+            <a:schemeClr val="accent1">
+              <a:shade val="50000"/>
+            </a:schemeClr>
+          </a:lnRef>
+          <a:fillRef idx="1">
+            <a:schemeClr val="accent1"/>
+          </a:fillRef>
+          <a:effectRef idx="0">
+            <a:schemeClr val="accent1"/>
+          </a:effectRef>
+          <a:fontRef idx="minor">
+            <a:schemeClr val="lt1"/>
+          </a:fontRef>
+        </p:style>
+        <p:txBody>
+          <a:bodyPr rtlCol="0" anchor="ctr"/>
+          <a:lstStyle/>
+          <a:p>
+            <a:pPr algn="ctr"/>
+            <a:endParaRPr lang="de-CH"/>
+          </a:p>
+        </p:txBody>
+      </p:sp>
+    </p:spTree>
+    <p:extLst>
+      <p:ext uri="{BB962C8B-B14F-4D97-AF65-F5344CB8AC3E}">
+        <p14:creationId xmlns:p14="http://schemas.microsoft.com/office/powerpoint/2010/main" val="400102484"/>
+      </p:ext>
+    </p:extLst>
+  </p:cSld>
+  <p:clrMapOvr>
+    <a:masterClrMapping/>
+  </p:clrMapOvr>
+</p:sld>
+</file>
+
+<file path=ppt/slides/slide5.xml><?xml version="1.0" encoding="utf-8"?>
+<p:sld xmlns:a="http://schemas.openxmlformats.org/drawingml/2006/main" xmlns:r="http://schemas.openxmlformats.org/officeDocument/2006/relationships" xmlns:p="http://schemas.openxmlformats.org/presentationml/2006/main">
+  <p:cSld>
+    <p:spTree>
+      <p:nvGrpSpPr>
+        <p:cNvPr id="1" name=""/>
+        <p:cNvGrpSpPr/>
+        <p:nvPr/>
+      </p:nvGrpSpPr>
+      <p:grpSpPr>
+        <a:xfrm>
+          <a:off x="0" y="0"/>
+          <a:ext cx="0" cy="0"/>
+          <a:chOff x="0" y="0"/>
+          <a:chExt cx="0" cy="0"/>
+        </a:xfrm>
+      </p:grpSpPr>
+      <p:sp>
+        <p:nvSpPr>
+          <p:cNvPr id="2" name="Abgerundetes Rechteck 1"/>
+          <p:cNvSpPr/>
+          <p:nvPr/>
+        </p:nvSpPr>
+        <p:spPr>
+          <a:xfrm>
+            <a:off x="2471776" y="1417625"/>
+            <a:ext cx="5860752" cy="4007404"/>
+          </a:xfrm>
+          <a:prstGeom prst="roundRect">
+            <a:avLst>
+              <a:gd name="adj" fmla="val 1200"/>
+            </a:avLst>
+          </a:prstGeom>
+          <a:ln w="38100"/>
+        </p:spPr>
+        <p:style>
+          <a:lnRef idx="2">
+            <a:schemeClr val="accent1"/>
+          </a:lnRef>
+          <a:fillRef idx="1">
+            <a:schemeClr val="lt1"/>
+          </a:fillRef>
+          <a:effectRef idx="0">
+            <a:schemeClr val="accent1"/>
+          </a:effectRef>
+          <a:fontRef idx="minor">
+            <a:schemeClr val="dk1"/>
+          </a:fontRef>
+        </p:style>
+        <p:txBody>
+          <a:bodyPr rtlCol="0" anchor="ctr"/>
+          <a:lstStyle/>
+          <a:p>
+            <a:pPr algn="ctr"/>
+            <a:endParaRPr lang="de-CH" dirty="0"/>
+          </a:p>
+        </p:txBody>
+      </p:sp>
+      <p:sp>
+        <p:nvSpPr>
+          <p:cNvPr id="11" name="Textfeld 10"/>
+          <p:cNvSpPr txBox="1"/>
+          <p:nvPr/>
+        </p:nvSpPr>
+        <p:spPr>
+          <a:xfrm>
+            <a:off x="5098098" y="1076472"/>
+            <a:ext cx="561244" cy="369332"/>
+          </a:xfrm>
+          <a:prstGeom prst="rect">
+            <a:avLst/>
+          </a:prstGeom>
+          <a:noFill/>
+        </p:spPr>
+        <p:txBody>
+          <a:bodyPr wrap="none" rtlCol="0">
+            <a:spAutoFit/>
+          </a:bodyPr>
+          <a:lstStyle/>
+          <a:p>
+            <a:r>
+              <a:rPr lang="de-CH" dirty="0" smtClean="0"/>
+              <a:t>TOP</a:t>
+            </a:r>
+            <a:endParaRPr lang="de-CH" dirty="0"/>
+          </a:p>
+        </p:txBody>
+      </p:sp>
+      <p:sp>
+        <p:nvSpPr>
+          <p:cNvPr id="12" name="Textfeld 11"/>
+          <p:cNvSpPr txBox="1"/>
+          <p:nvPr/>
+        </p:nvSpPr>
+        <p:spPr>
+          <a:xfrm>
+            <a:off x="4914977" y="5396854"/>
+            <a:ext cx="1026243" cy="369332"/>
+          </a:xfrm>
+          <a:prstGeom prst="rect">
+            <a:avLst/>
+          </a:prstGeom>
+          <a:noFill/>
+        </p:spPr>
+        <p:txBody>
+          <a:bodyPr wrap="none" rtlCol="0">
+            <a:spAutoFit/>
+          </a:bodyPr>
+          <a:lstStyle/>
+          <a:p>
+            <a:r>
+              <a:rPr lang="de-CH" dirty="0" smtClean="0"/>
+              <a:t>BOTTOM</a:t>
+            </a:r>
+            <a:endParaRPr lang="de-CH" dirty="0"/>
+          </a:p>
+        </p:txBody>
+      </p:sp>
+      <p:sp>
+        <p:nvSpPr>
+          <p:cNvPr id="13" name="Textfeld 12"/>
+          <p:cNvSpPr txBox="1"/>
+          <p:nvPr/>
+        </p:nvSpPr>
+        <p:spPr>
+          <a:xfrm>
+            <a:off x="2200847" y="2821163"/>
+            <a:ext cx="296876" cy="1200329"/>
+          </a:xfrm>
+          <a:prstGeom prst="rect">
+            <a:avLst/>
+          </a:prstGeom>
+          <a:noFill/>
+        </p:spPr>
+        <p:txBody>
+          <a:bodyPr wrap="none" rtlCol="0">
+            <a:spAutoFit/>
+          </a:bodyPr>
+          <a:lstStyle/>
+          <a:p>
+            <a:pPr algn="ctr"/>
+            <a:r>
+              <a:rPr lang="de-CH" dirty="0" smtClean="0"/>
+              <a:t>L</a:t>
+            </a:r>
+          </a:p>
+          <a:p>
+            <a:pPr algn="ctr"/>
+            <a:r>
+              <a:rPr lang="de-CH" dirty="0" smtClean="0"/>
+              <a:t>E</a:t>
+            </a:r>
+          </a:p>
+          <a:p>
+            <a:pPr algn="ctr"/>
+            <a:r>
+              <a:rPr lang="de-CH" dirty="0" smtClean="0"/>
+              <a:t>F</a:t>
+            </a:r>
+          </a:p>
+          <a:p>
+            <a:pPr algn="ctr"/>
+            <a:r>
+              <a:rPr lang="de-CH" dirty="0" smtClean="0"/>
+              <a:t>T</a:t>
+            </a:r>
+            <a:endParaRPr lang="de-CH" dirty="0"/>
+          </a:p>
+        </p:txBody>
+      </p:sp>
+      <p:sp>
+        <p:nvSpPr>
+          <p:cNvPr id="14" name="Textfeld 13"/>
+          <p:cNvSpPr txBox="1"/>
+          <p:nvPr/>
+        </p:nvSpPr>
+        <p:spPr>
+          <a:xfrm>
+            <a:off x="8353872" y="2682664"/>
+            <a:ext cx="330540" cy="1477328"/>
+          </a:xfrm>
+          <a:prstGeom prst="rect">
+            <a:avLst/>
+          </a:prstGeom>
+          <a:noFill/>
+        </p:spPr>
+        <p:txBody>
+          <a:bodyPr wrap="none" rtlCol="0">
+            <a:spAutoFit/>
+          </a:bodyPr>
+          <a:lstStyle/>
+          <a:p>
+            <a:pPr algn="ctr"/>
+            <a:r>
+              <a:rPr lang="de-CH" dirty="0" smtClean="0"/>
+              <a:t>R</a:t>
+            </a:r>
+          </a:p>
+          <a:p>
+            <a:pPr algn="ctr"/>
+            <a:r>
+              <a:rPr lang="de-CH" dirty="0" smtClean="0"/>
+              <a:t>I</a:t>
+            </a:r>
+          </a:p>
+          <a:p>
+            <a:pPr algn="ctr"/>
+            <a:r>
+              <a:rPr lang="de-CH" dirty="0" smtClean="0"/>
+              <a:t>G</a:t>
+            </a:r>
+            <a:endParaRPr lang="de-CH" u="sng" dirty="0" smtClean="0"/>
+          </a:p>
+          <a:p>
+            <a:pPr algn="ctr"/>
+            <a:r>
+              <a:rPr lang="de-CH" dirty="0" smtClean="0"/>
+              <a:t>H</a:t>
+            </a:r>
+          </a:p>
+          <a:p>
+            <a:pPr algn="ctr"/>
+            <a:r>
+              <a:rPr lang="de-CH" dirty="0" smtClean="0"/>
+              <a:t>T</a:t>
+            </a:r>
+            <a:endParaRPr lang="de-CH" dirty="0"/>
+          </a:p>
+        </p:txBody>
+      </p:sp>
+      <p:sp>
+        <p:nvSpPr>
+          <p:cNvPr id="15" name="Rechteck 14"/>
+          <p:cNvSpPr/>
+          <p:nvPr/>
+        </p:nvSpPr>
+        <p:spPr>
+          <a:xfrm>
+            <a:off x="2154057" y="1076472"/>
+            <a:ext cx="6530356" cy="4735184"/>
+          </a:xfrm>
+          <a:prstGeom prst="rect">
+            <a:avLst/>
+          </a:prstGeom>
+          <a:noFill/>
+          <a:ln>
+            <a:solidFill>
+              <a:schemeClr val="accent6">
+                <a:lumMod val="20000"/>
+                <a:lumOff val="80000"/>
+              </a:schemeClr>
+            </a:solidFill>
+          </a:ln>
+        </p:spPr>
+        <p:style>
+          <a:lnRef idx="2">
+            <a:schemeClr val="accent1">
+              <a:shade val="50000"/>
+            </a:schemeClr>
+          </a:lnRef>
+          <a:fillRef idx="1">
+            <a:schemeClr val="accent1"/>
+          </a:fillRef>
+          <a:effectRef idx="0">
+            <a:schemeClr val="accent1"/>
+          </a:effectRef>
+          <a:fontRef idx="minor">
+            <a:schemeClr val="lt1"/>
+          </a:fontRef>
+        </p:style>
+        <p:txBody>
+          <a:bodyPr rtlCol="0" anchor="ctr"/>
+          <a:lstStyle/>
+          <a:p>
+            <a:pPr algn="ctr"/>
+            <a:endParaRPr lang="de-CH"/>
+          </a:p>
+        </p:txBody>
+      </p:sp>
+      <p:pic>
+        <p:nvPicPr>
+          <p:cNvPr id="8" name="Grafik 7"/>
+          <p:cNvPicPr>
+            <a:picLocks noChangeAspect="1"/>
+          </p:cNvPicPr>
+          <p:nvPr/>
+        </p:nvPicPr>
+        <p:blipFill>
+          <a:blip r:embed="rId2"/>
+          <a:stretch>
+            <a:fillRect/>
+          </a:stretch>
+        </p:blipFill>
+        <p:spPr>
+          <a:xfrm>
+            <a:off x="2457488" y="1435567"/>
+            <a:ext cx="5896384" cy="104558"/>
+          </a:xfrm>
+          <a:prstGeom prst="rect">
+            <a:avLst/>
+          </a:prstGeom>
+        </p:spPr>
+      </p:pic>
+      <p:pic>
+        <p:nvPicPr>
+          <p:cNvPr id="16" name="Grafik 15"/>
+          <p:cNvPicPr>
+            <a:picLocks noChangeAspect="1"/>
+          </p:cNvPicPr>
+          <p:nvPr/>
+        </p:nvPicPr>
+        <p:blipFill rotWithShape="1">
+          <a:blip r:embed="rId3"/>
+          <a:srcRect r="16836"/>
+          <a:stretch/>
+        </p:blipFill>
+        <p:spPr>
+          <a:xfrm>
+            <a:off x="2971106" y="5299184"/>
+            <a:ext cx="4896258" cy="104400"/>
+          </a:xfrm>
+          <a:prstGeom prst="rect">
+            <a:avLst/>
+          </a:prstGeom>
+        </p:spPr>
+      </p:pic>
+      <p:pic>
+        <p:nvPicPr>
+          <p:cNvPr id="17" name="Grafik 16"/>
+          <p:cNvPicPr>
+            <a:picLocks noChangeAspect="1"/>
+          </p:cNvPicPr>
+          <p:nvPr/>
+        </p:nvPicPr>
+        <p:blipFill>
+          <a:blip r:embed="rId4"/>
+          <a:stretch>
+            <a:fillRect/>
+          </a:stretch>
+        </p:blipFill>
+        <p:spPr>
+          <a:xfrm>
+            <a:off x="4460629" y="1704857"/>
+            <a:ext cx="1425870" cy="2019430"/>
+          </a:xfrm>
+          <a:prstGeom prst="rect">
+            <a:avLst/>
+          </a:prstGeom>
+        </p:spPr>
+      </p:pic>
+      <p:pic>
+        <p:nvPicPr>
+          <p:cNvPr id="18" name="Grafik 17"/>
+          <p:cNvPicPr>
+            <a:picLocks noChangeAspect="1"/>
+          </p:cNvPicPr>
+          <p:nvPr/>
+        </p:nvPicPr>
+        <p:blipFill>
+          <a:blip r:embed="rId5"/>
+          <a:stretch>
+            <a:fillRect/>
+          </a:stretch>
+        </p:blipFill>
+        <p:spPr>
+          <a:xfrm>
+            <a:off x="6153961" y="2267783"/>
+            <a:ext cx="1424276" cy="1916659"/>
+          </a:xfrm>
+          <a:prstGeom prst="rect">
+            <a:avLst/>
+          </a:prstGeom>
+        </p:spPr>
+      </p:pic>
+      <p:sp>
+        <p:nvSpPr>
+          <p:cNvPr id="19" name="Textfeld 18"/>
+          <p:cNvSpPr txBox="1"/>
+          <p:nvPr/>
+        </p:nvSpPr>
+        <p:spPr>
+          <a:xfrm>
+            <a:off x="6238384" y="1517059"/>
+            <a:ext cx="919867" cy="338554"/>
+          </a:xfrm>
+          <a:prstGeom prst="rect">
+            <a:avLst/>
+          </a:prstGeom>
+          <a:noFill/>
+        </p:spPr>
+        <p:txBody>
+          <a:bodyPr wrap="none" rtlCol="0">
+            <a:spAutoFit/>
+          </a:bodyPr>
+          <a:lstStyle/>
+          <a:p>
+            <a:r>
+              <a:rPr lang="de-CH" sz="1600" dirty="0" smtClean="0">
+                <a:solidFill>
+                  <a:srgbClr val="FF0000"/>
+                </a:solidFill>
+              </a:rPr>
+              <a:t>Bar - Top</a:t>
+            </a:r>
+            <a:endParaRPr lang="de-CH" sz="1600" dirty="0">
+              <a:solidFill>
+                <a:srgbClr val="FF0000"/>
+              </a:solidFill>
+            </a:endParaRPr>
+          </a:p>
+        </p:txBody>
+      </p:sp>
+      <p:sp>
+        <p:nvSpPr>
+          <p:cNvPr id="20" name="Textfeld 19"/>
+          <p:cNvSpPr txBox="1"/>
+          <p:nvPr/>
+        </p:nvSpPr>
+        <p:spPr>
+          <a:xfrm>
+            <a:off x="4771242" y="4952298"/>
+            <a:ext cx="1261820" cy="338554"/>
+          </a:xfrm>
+          <a:prstGeom prst="rect">
+            <a:avLst/>
+          </a:prstGeom>
+          <a:noFill/>
+        </p:spPr>
+        <p:txBody>
+          <a:bodyPr wrap="none" rtlCol="0">
+            <a:spAutoFit/>
+          </a:bodyPr>
+          <a:lstStyle/>
+          <a:p>
+            <a:r>
+              <a:rPr lang="de-CH" sz="1600" dirty="0" err="1" smtClean="0">
+                <a:solidFill>
+                  <a:srgbClr val="FF0000"/>
+                </a:solidFill>
+              </a:rPr>
+              <a:t>Tile</a:t>
+            </a:r>
+            <a:r>
+              <a:rPr lang="de-CH" sz="1600" dirty="0" smtClean="0">
+                <a:solidFill>
+                  <a:srgbClr val="FF0000"/>
+                </a:solidFill>
+              </a:rPr>
+              <a:t> - </a:t>
+            </a:r>
+            <a:r>
+              <a:rPr lang="de-CH" sz="1600" dirty="0" err="1" smtClean="0">
+                <a:solidFill>
+                  <a:srgbClr val="FF0000"/>
+                </a:solidFill>
+              </a:rPr>
+              <a:t>Bottom</a:t>
+            </a:r>
+            <a:endParaRPr lang="de-CH" sz="1600" dirty="0">
+              <a:solidFill>
+                <a:srgbClr val="FF0000"/>
+              </a:solidFill>
+            </a:endParaRPr>
+          </a:p>
+        </p:txBody>
+      </p:sp>
+      <p:sp>
+        <p:nvSpPr>
+          <p:cNvPr id="21" name="Textfeld 20"/>
+          <p:cNvSpPr txBox="1"/>
+          <p:nvPr/>
+        </p:nvSpPr>
+        <p:spPr>
+          <a:xfrm>
+            <a:off x="4160969" y="3682938"/>
+            <a:ext cx="1906548" cy="338554"/>
+          </a:xfrm>
+          <a:prstGeom prst="rect">
+            <a:avLst/>
+          </a:prstGeom>
+          <a:noFill/>
+        </p:spPr>
+        <p:txBody>
+          <a:bodyPr wrap="none" rtlCol="0">
+            <a:spAutoFit/>
+          </a:bodyPr>
+          <a:lstStyle/>
+          <a:p>
+            <a:r>
+              <a:rPr lang="de-CH" sz="1600" dirty="0" err="1" smtClean="0">
+                <a:solidFill>
+                  <a:srgbClr val="FF0000"/>
+                </a:solidFill>
+              </a:rPr>
+              <a:t>Window</a:t>
+            </a:r>
+            <a:r>
+              <a:rPr lang="de-CH" sz="1600" dirty="0" smtClean="0">
+                <a:solidFill>
+                  <a:srgbClr val="FF0000"/>
+                </a:solidFill>
+              </a:rPr>
+              <a:t> – </a:t>
+            </a:r>
+            <a:r>
+              <a:rPr lang="de-CH" sz="1600" dirty="0" err="1" smtClean="0">
+                <a:solidFill>
+                  <a:srgbClr val="FF0000"/>
+                </a:solidFill>
+              </a:rPr>
+              <a:t>Left</a:t>
+            </a:r>
+            <a:r>
+              <a:rPr lang="de-CH" sz="1600" dirty="0" smtClean="0">
+                <a:solidFill>
+                  <a:srgbClr val="FF0000"/>
+                </a:solidFill>
+              </a:rPr>
+              <a:t>/</a:t>
+            </a:r>
+            <a:r>
+              <a:rPr lang="de-CH" sz="1600" dirty="0" err="1" smtClean="0">
+                <a:solidFill>
+                  <a:srgbClr val="FF0000"/>
+                </a:solidFill>
+              </a:rPr>
+              <a:t>Right</a:t>
+            </a:r>
+            <a:endParaRPr lang="de-CH" sz="1600" dirty="0">
+              <a:solidFill>
+                <a:srgbClr val="FF0000"/>
+              </a:solidFill>
+            </a:endParaRPr>
+          </a:p>
+        </p:txBody>
+      </p:sp>
+      <p:sp>
+        <p:nvSpPr>
+          <p:cNvPr id="22" name="Textfeld 21"/>
+          <p:cNvSpPr txBox="1"/>
+          <p:nvPr/>
+        </p:nvSpPr>
+        <p:spPr>
+          <a:xfrm>
+            <a:off x="5474211" y="4184115"/>
+            <a:ext cx="2783775" cy="338554"/>
+          </a:xfrm>
+          <a:prstGeom prst="rect">
+            <a:avLst/>
+          </a:prstGeom>
+          <a:noFill/>
+        </p:spPr>
+        <p:txBody>
+          <a:bodyPr wrap="none" rtlCol="0">
+            <a:spAutoFit/>
+          </a:bodyPr>
+          <a:lstStyle/>
+          <a:p>
+            <a:r>
+              <a:rPr lang="de-CH" sz="1600" dirty="0" err="1" smtClean="0">
+                <a:solidFill>
+                  <a:srgbClr val="FF0000"/>
+                </a:solidFill>
+              </a:rPr>
+              <a:t>Window</a:t>
+            </a:r>
+            <a:r>
+              <a:rPr lang="de-CH" sz="1600" dirty="0" smtClean="0">
+                <a:solidFill>
+                  <a:srgbClr val="FF0000"/>
+                </a:solidFill>
+              </a:rPr>
+              <a:t> </a:t>
+            </a:r>
+            <a:r>
+              <a:rPr lang="de-CH" sz="1600" dirty="0" err="1" smtClean="0">
+                <a:solidFill>
+                  <a:srgbClr val="FF0000"/>
+                </a:solidFill>
+              </a:rPr>
+              <a:t>no</a:t>
+            </a:r>
+            <a:r>
+              <a:rPr lang="de-CH" sz="1600" dirty="0" smtClean="0">
+                <a:solidFill>
+                  <a:srgbClr val="FF0000"/>
+                </a:solidFill>
+              </a:rPr>
+              <a:t> </a:t>
+            </a:r>
+            <a:r>
+              <a:rPr lang="de-CH" sz="1600" dirty="0" err="1" smtClean="0">
+                <a:solidFill>
+                  <a:srgbClr val="FF0000"/>
+                </a:solidFill>
+              </a:rPr>
+              <a:t>border</a:t>
+            </a:r>
+            <a:r>
+              <a:rPr lang="de-CH" sz="1600" dirty="0" smtClean="0">
+                <a:solidFill>
+                  <a:srgbClr val="FF0000"/>
+                </a:solidFill>
+              </a:rPr>
+              <a:t> – </a:t>
+            </a:r>
+            <a:r>
+              <a:rPr lang="de-CH" sz="1600" dirty="0" err="1" smtClean="0">
+                <a:solidFill>
+                  <a:srgbClr val="FF0000"/>
+                </a:solidFill>
+              </a:rPr>
+              <a:t>Left</a:t>
+            </a:r>
+            <a:r>
+              <a:rPr lang="de-CH" sz="1600" dirty="0" smtClean="0">
+                <a:solidFill>
+                  <a:srgbClr val="FF0000"/>
+                </a:solidFill>
+              </a:rPr>
+              <a:t>/</a:t>
+            </a:r>
+            <a:r>
+              <a:rPr lang="de-CH" sz="1600" dirty="0" err="1" smtClean="0">
+                <a:solidFill>
+                  <a:srgbClr val="FF0000"/>
+                </a:solidFill>
+              </a:rPr>
+              <a:t>Right</a:t>
+            </a:r>
+            <a:endParaRPr lang="de-CH" sz="1600" dirty="0">
+              <a:solidFill>
+                <a:srgbClr val="FF0000"/>
+              </a:solidFill>
+            </a:endParaRPr>
+          </a:p>
+        </p:txBody>
+      </p:sp>
+      <p:pic>
+        <p:nvPicPr>
+          <p:cNvPr id="23" name="Grafik 22"/>
+          <p:cNvPicPr>
+            <a:picLocks noChangeAspect="1"/>
+          </p:cNvPicPr>
+          <p:nvPr/>
+        </p:nvPicPr>
+        <p:blipFill>
+          <a:blip r:embed="rId6"/>
+          <a:stretch>
+            <a:fillRect/>
+          </a:stretch>
+        </p:blipFill>
+        <p:spPr>
+          <a:xfrm>
+            <a:off x="2471775" y="2267783"/>
+            <a:ext cx="1383473" cy="1879191"/>
+          </a:xfrm>
+          <a:prstGeom prst="rect">
+            <a:avLst/>
+          </a:prstGeom>
+        </p:spPr>
+      </p:pic>
+      <p:sp>
+        <p:nvSpPr>
+          <p:cNvPr id="24" name="Textfeld 23"/>
+          <p:cNvSpPr txBox="1"/>
+          <p:nvPr/>
+        </p:nvSpPr>
+        <p:spPr>
+          <a:xfrm>
+            <a:off x="2536129" y="4293652"/>
+            <a:ext cx="953915" cy="338554"/>
+          </a:xfrm>
+          <a:prstGeom prst="rect">
+            <a:avLst/>
+          </a:prstGeom>
+          <a:noFill/>
+        </p:spPr>
+        <p:txBody>
+          <a:bodyPr wrap="none" rtlCol="0">
+            <a:spAutoFit/>
+          </a:bodyPr>
+          <a:lstStyle/>
+          <a:p>
+            <a:r>
+              <a:rPr lang="de-CH" sz="1600" dirty="0" err="1" smtClean="0">
+                <a:solidFill>
+                  <a:srgbClr val="FF0000"/>
+                </a:solidFill>
+              </a:rPr>
+              <a:t>Tile</a:t>
+            </a:r>
+            <a:r>
+              <a:rPr lang="de-CH" sz="1600" dirty="0" smtClean="0">
+                <a:solidFill>
+                  <a:srgbClr val="FF0000"/>
+                </a:solidFill>
+              </a:rPr>
+              <a:t> - </a:t>
+            </a:r>
+            <a:r>
+              <a:rPr lang="de-CH" sz="1600" dirty="0" err="1" smtClean="0">
+                <a:solidFill>
+                  <a:srgbClr val="FF0000"/>
+                </a:solidFill>
+              </a:rPr>
+              <a:t>Left</a:t>
+            </a:r>
+            <a:endParaRPr lang="de-CH" sz="1600" dirty="0">
+              <a:solidFill>
+                <a:srgbClr val="FF0000"/>
+              </a:solidFill>
+            </a:endParaRPr>
+          </a:p>
+        </p:txBody>
+      </p:sp>
+      <p:sp>
+        <p:nvSpPr>
+          <p:cNvPr id="26" name="Pfeil nach unten 25"/>
+          <p:cNvSpPr/>
+          <p:nvPr/>
+        </p:nvSpPr>
+        <p:spPr>
+          <a:xfrm>
+            <a:off x="3013087" y="4174589"/>
+            <a:ext cx="157163" cy="119063"/>
+          </a:xfrm>
+          <a:prstGeom prst="downArrow">
+            <a:avLst/>
+          </a:prstGeom>
+        </p:spPr>
+        <p:style>
+          <a:lnRef idx="2">
+            <a:schemeClr val="accent1">
+              <a:shade val="50000"/>
+            </a:schemeClr>
+          </a:lnRef>
+          <a:fillRef idx="1">
+            <a:schemeClr val="accent1"/>
+          </a:fillRef>
+          <a:effectRef idx="0">
+            <a:schemeClr val="accent1"/>
+          </a:effectRef>
+          <a:fontRef idx="minor">
+            <a:schemeClr val="lt1"/>
+          </a:fontRef>
+        </p:style>
+        <p:txBody>
+          <a:bodyPr rtlCol="0" anchor="ctr"/>
+          <a:lstStyle/>
+          <a:p>
+            <a:pPr algn="ctr"/>
+            <a:endParaRPr lang="de-CH"/>
+          </a:p>
+        </p:txBody>
+      </p:sp>
+      <p:sp>
+        <p:nvSpPr>
+          <p:cNvPr id="27" name="Pfeil nach unten 26"/>
+          <p:cNvSpPr/>
+          <p:nvPr/>
+        </p:nvSpPr>
+        <p:spPr>
+          <a:xfrm flipV="1">
+            <a:off x="3013087" y="2109182"/>
+            <a:ext cx="157163" cy="119063"/>
+          </a:xfrm>
+          <a:prstGeom prst="downArrow">
+            <a:avLst/>
+          </a:prstGeom>
+        </p:spPr>
+        <p:style>
+          <a:lnRef idx="2">
+            <a:schemeClr val="accent1">
+              <a:shade val="50000"/>
+            </a:schemeClr>
+          </a:lnRef>
+          <a:fillRef idx="1">
+            <a:schemeClr val="accent1"/>
+          </a:fillRef>
+          <a:effectRef idx="0">
+            <a:schemeClr val="accent1"/>
+          </a:effectRef>
+          <a:fontRef idx="minor">
+            <a:schemeClr val="lt1"/>
+          </a:fontRef>
+        </p:style>
+        <p:txBody>
+          <a:bodyPr rtlCol="0" anchor="ctr"/>
+          <a:lstStyle/>
+          <a:p>
+            <a:pPr algn="ctr"/>
+            <a:endParaRPr lang="de-CH"/>
+          </a:p>
+        </p:txBody>
+      </p:sp>
+      <p:sp>
+        <p:nvSpPr>
+          <p:cNvPr id="28" name="Pfeil nach unten 27"/>
+          <p:cNvSpPr/>
+          <p:nvPr/>
+        </p:nvSpPr>
+        <p:spPr>
+          <a:xfrm rot="5400000" flipV="1">
+            <a:off x="7905193" y="5265471"/>
+            <a:ext cx="157163" cy="119063"/>
+          </a:xfrm>
+          <a:prstGeom prst="downArrow">
+            <a:avLst/>
+          </a:prstGeom>
+        </p:spPr>
+        <p:style>
+          <a:lnRef idx="2">
+            <a:schemeClr val="accent1">
+              <a:shade val="50000"/>
+            </a:schemeClr>
+          </a:lnRef>
+          <a:fillRef idx="1">
+            <a:schemeClr val="accent1"/>
+          </a:fillRef>
+          <a:effectRef idx="0">
+            <a:schemeClr val="accent1"/>
+          </a:effectRef>
+          <a:fontRef idx="minor">
+            <a:schemeClr val="lt1"/>
+          </a:fontRef>
+        </p:style>
+        <p:txBody>
+          <a:bodyPr rtlCol="0" anchor="ctr"/>
+          <a:lstStyle/>
+          <a:p>
+            <a:pPr algn="ctr"/>
+            <a:endParaRPr lang="de-CH"/>
+          </a:p>
+        </p:txBody>
+      </p:sp>
+      <p:sp>
+        <p:nvSpPr>
+          <p:cNvPr id="29" name="Pfeil nach unten 28"/>
+          <p:cNvSpPr/>
+          <p:nvPr/>
+        </p:nvSpPr>
+        <p:spPr>
+          <a:xfrm rot="16200000" flipH="1" flipV="1">
+            <a:off x="2784898" y="5257262"/>
+            <a:ext cx="157163" cy="119063"/>
+          </a:xfrm>
+          <a:prstGeom prst="downArrow">
+            <a:avLst/>
+          </a:prstGeom>
+        </p:spPr>
+        <p:style>
+          <a:lnRef idx="2">
+            <a:schemeClr val="accent1">
+              <a:shade val="50000"/>
+            </a:schemeClr>
+          </a:lnRef>
+          <a:fillRef idx="1">
+            <a:schemeClr val="accent1"/>
+          </a:fillRef>
+          <a:effectRef idx="0">
+            <a:schemeClr val="accent1"/>
+          </a:effectRef>
+          <a:fontRef idx="minor">
+            <a:schemeClr val="lt1"/>
+          </a:fontRef>
+        </p:style>
+        <p:txBody>
+          <a:bodyPr rtlCol="0" anchor="ctr"/>
+          <a:lstStyle/>
+          <a:p>
+            <a:pPr algn="ctr"/>
+            <a:endParaRPr lang="de-CH"/>
+          </a:p>
+        </p:txBody>
+      </p:sp>
+      <p:sp>
+        <p:nvSpPr>
+          <p:cNvPr id="30" name="Pfeil in vier Richtungen 29"/>
+          <p:cNvSpPr/>
+          <p:nvPr/>
+        </p:nvSpPr>
+        <p:spPr>
+          <a:xfrm>
+            <a:off x="5459155" y="1633386"/>
+            <a:ext cx="238033" cy="247044"/>
+          </a:xfrm>
+          <a:prstGeom prst="quadArrow">
+            <a:avLst>
+              <a:gd name="adj1" fmla="val 22500"/>
+              <a:gd name="adj2" fmla="val 22500"/>
+              <a:gd name="adj3" fmla="val 12496"/>
+            </a:avLst>
+          </a:prstGeom>
+        </p:spPr>
+        <p:style>
+          <a:lnRef idx="2">
+            <a:schemeClr val="accent1">
+              <a:shade val="50000"/>
+            </a:schemeClr>
+          </a:lnRef>
+          <a:fillRef idx="1">
+            <a:schemeClr val="accent1"/>
+          </a:fillRef>
+          <a:effectRef idx="0">
+            <a:schemeClr val="accent1"/>
+          </a:effectRef>
+          <a:fontRef idx="minor">
+            <a:schemeClr val="lt1"/>
+          </a:fontRef>
+        </p:style>
+        <p:txBody>
+          <a:bodyPr rtlCol="0" anchor="ctr"/>
+          <a:lstStyle/>
+          <a:p>
+            <a:pPr algn="ctr"/>
+            <a:endParaRPr lang="de-CH"/>
+          </a:p>
+        </p:txBody>
+      </p:sp>
+      <p:sp>
+        <p:nvSpPr>
+          <p:cNvPr id="31" name="Pfeil in vier Richtungen 30"/>
+          <p:cNvSpPr/>
+          <p:nvPr/>
+        </p:nvSpPr>
+        <p:spPr>
+          <a:xfrm>
+            <a:off x="7299400" y="2297757"/>
+            <a:ext cx="238033" cy="247044"/>
+          </a:xfrm>
+          <a:prstGeom prst="quadArrow">
+            <a:avLst>
+              <a:gd name="adj1" fmla="val 22500"/>
+              <a:gd name="adj2" fmla="val 22500"/>
+              <a:gd name="adj3" fmla="val 12496"/>
+            </a:avLst>
+          </a:prstGeom>
+        </p:spPr>
+        <p:style>
+          <a:lnRef idx="2">
+            <a:schemeClr val="accent1">
+              <a:shade val="50000"/>
+            </a:schemeClr>
+          </a:lnRef>
+          <a:fillRef idx="1">
+            <a:schemeClr val="accent1"/>
+          </a:fillRef>
+          <a:effectRef idx="0">
+            <a:schemeClr val="accent1"/>
+          </a:effectRef>
+          <a:fontRef idx="minor">
+            <a:schemeClr val="lt1"/>
+          </a:fontRef>
+        </p:style>
+        <p:txBody>
+          <a:bodyPr rtlCol="0" anchor="ctr"/>
+          <a:lstStyle/>
+          <a:p>
+            <a:pPr algn="ctr"/>
+            <a:endParaRPr lang="de-CH"/>
+          </a:p>
+        </p:txBody>
+      </p:sp>
+    </p:spTree>
+    <p:extLst>
+      <p:ext uri="{BB962C8B-B14F-4D97-AF65-F5344CB8AC3E}">
+        <p14:creationId xmlns:p14="http://schemas.microsoft.com/office/powerpoint/2010/main" val="991738030"/>
+      </p:ext>
+    </p:extLst>
+  </p:cSld>
+  <p:clrMapOvr>
+    <a:masterClrMapping/>
+  </p:clrMapOvr>
+</p:sld>
+</file>
+
+<file path=ppt/slides/slide6.xml><?xml version="1.0" encoding="utf-8"?>
+<p:sld xmlns:a="http://schemas.openxmlformats.org/drawingml/2006/main" xmlns:r="http://schemas.openxmlformats.org/officeDocument/2006/relationships" xmlns:p="http://schemas.openxmlformats.org/presentationml/2006/main">
+  <p:cSld>
+    <p:spTree>
+      <p:nvGrpSpPr>
+        <p:cNvPr id="1" name=""/>
+        <p:cNvGrpSpPr/>
+        <p:nvPr/>
+      </p:nvGrpSpPr>
+      <p:grpSpPr>
+        <a:xfrm>
+          <a:off x="0" y="0"/>
+          <a:ext cx="0" cy="0"/>
+          <a:chOff x="0" y="0"/>
+          <a:chExt cx="0" cy="0"/>
+        </a:xfrm>
+      </p:grpSpPr>
+      <p:pic>
+        <p:nvPicPr>
+          <p:cNvPr id="2" name="Grafik 1"/>
+          <p:cNvPicPr>
+            <a:picLocks noChangeAspect="1"/>
+          </p:cNvPicPr>
+          <p:nvPr/>
+        </p:nvPicPr>
+        <p:blipFill>
+          <a:blip r:embed="rId2"/>
+          <a:stretch>
+            <a:fillRect/>
+          </a:stretch>
+        </p:blipFill>
+        <p:spPr>
+          <a:xfrm>
+            <a:off x="199678" y="159560"/>
+            <a:ext cx="3610291" cy="3080730"/>
+          </a:xfrm>
+          <a:prstGeom prst="rect">
+            <a:avLst/>
+          </a:prstGeom>
+        </p:spPr>
+      </p:pic>
+      <p:sp>
+        <p:nvSpPr>
+          <p:cNvPr id="3" name="Rechteck 2"/>
+          <p:cNvSpPr/>
+          <p:nvPr/>
+        </p:nvSpPr>
+        <p:spPr>
+          <a:xfrm>
+            <a:off x="4277429" y="211724"/>
+            <a:ext cx="7081997" cy="6057132"/>
+          </a:xfrm>
+          <a:prstGeom prst="rect">
+            <a:avLst/>
+          </a:prstGeom>
+        </p:spPr>
+        <p:style>
+          <a:lnRef idx="2">
+            <a:schemeClr val="dk1"/>
+          </a:lnRef>
+          <a:fillRef idx="1">
+            <a:schemeClr val="lt1"/>
+          </a:fillRef>
+          <a:effectRef idx="0">
+            <a:schemeClr val="dk1"/>
+          </a:effectRef>
+          <a:fontRef idx="minor">
+            <a:schemeClr val="dk1"/>
+          </a:fontRef>
+        </p:style>
+        <p:txBody>
+          <a:bodyPr rtlCol="0" anchor="ctr"/>
+          <a:lstStyle/>
+          <a:p>
+            <a:pPr algn="ctr"/>
+            <a:endParaRPr lang="de-CH"/>
+          </a:p>
+        </p:txBody>
+      </p:sp>
+      <p:sp>
+        <p:nvSpPr>
+          <p:cNvPr id="4" name="Rechteck 3"/>
+          <p:cNvSpPr/>
+          <p:nvPr/>
+        </p:nvSpPr>
+        <p:spPr>
+          <a:xfrm>
+            <a:off x="4323453" y="435722"/>
+            <a:ext cx="5357525" cy="4977035"/>
+          </a:xfrm>
+          <a:prstGeom prst="rect">
+            <a:avLst/>
+          </a:prstGeom>
+        </p:spPr>
+        <p:style>
+          <a:lnRef idx="2">
+            <a:schemeClr val="accent1">
+              <a:shade val="50000"/>
+            </a:schemeClr>
+          </a:lnRef>
+          <a:fillRef idx="1">
+            <a:schemeClr val="accent1"/>
+          </a:fillRef>
+          <a:effectRef idx="0">
+            <a:schemeClr val="accent1"/>
+          </a:effectRef>
+          <a:fontRef idx="minor">
+            <a:schemeClr val="lt1"/>
+          </a:fontRef>
+        </p:style>
+        <p:txBody>
+          <a:bodyPr rtlCol="0" anchor="ctr"/>
+          <a:lstStyle/>
+          <a:p>
+            <a:pPr algn="ctr"/>
+            <a:endParaRPr lang="de-CH"/>
+          </a:p>
+        </p:txBody>
+      </p:sp>
+      <p:sp>
+        <p:nvSpPr>
+          <p:cNvPr id="5" name="Abgerundetes Rechteck 4"/>
+          <p:cNvSpPr/>
+          <p:nvPr/>
+        </p:nvSpPr>
+        <p:spPr>
+          <a:xfrm>
+            <a:off x="4387893" y="497091"/>
+            <a:ext cx="736430" cy="171834"/>
+          </a:xfrm>
+          <a:prstGeom prst="roundRect">
+            <a:avLst/>
+          </a:prstGeom>
+        </p:spPr>
+        <p:style>
+          <a:lnRef idx="2">
+            <a:schemeClr val="accent3">
+              <a:shade val="50000"/>
+            </a:schemeClr>
+          </a:lnRef>
+          <a:fillRef idx="1">
+            <a:schemeClr val="accent3"/>
+          </a:fillRef>
+          <a:effectRef idx="0">
+            <a:schemeClr val="accent3"/>
+          </a:effectRef>
+          <a:fontRef idx="minor">
+            <a:schemeClr val="lt1"/>
+          </a:fontRef>
+        </p:style>
+        <p:txBody>
+          <a:bodyPr rtlCol="0" anchor="ctr"/>
+          <a:lstStyle/>
+          <a:p>
+            <a:pPr algn="ctr"/>
+            <a:r>
+              <a:rPr lang="de-CH" sz="1000" dirty="0" smtClean="0"/>
+              <a:t>Tab</a:t>
+            </a:r>
+            <a:endParaRPr lang="de-CH" sz="1000" dirty="0"/>
+          </a:p>
+        </p:txBody>
+      </p:sp>
+      <p:sp>
+        <p:nvSpPr>
+          <p:cNvPr id="6" name="Abgerundetes Rechteck 5"/>
+          <p:cNvSpPr/>
+          <p:nvPr/>
+        </p:nvSpPr>
+        <p:spPr>
+          <a:xfrm>
+            <a:off x="5124323" y="497091"/>
+            <a:ext cx="736430" cy="171834"/>
+          </a:xfrm>
+          <a:prstGeom prst="roundRect">
+            <a:avLst/>
+          </a:prstGeom>
+        </p:spPr>
+        <p:style>
+          <a:lnRef idx="2">
+            <a:schemeClr val="accent3">
+              <a:shade val="50000"/>
+            </a:schemeClr>
+          </a:lnRef>
+          <a:fillRef idx="1">
+            <a:schemeClr val="accent3"/>
+          </a:fillRef>
+          <a:effectRef idx="0">
+            <a:schemeClr val="accent3"/>
+          </a:effectRef>
+          <a:fontRef idx="minor">
+            <a:schemeClr val="lt1"/>
+          </a:fontRef>
+        </p:style>
+        <p:txBody>
+          <a:bodyPr rtlCol="0" anchor="ctr"/>
+          <a:lstStyle/>
+          <a:p>
+            <a:pPr algn="ctr"/>
+            <a:endParaRPr lang="de-CH"/>
+          </a:p>
+        </p:txBody>
+      </p:sp>
+      <p:sp>
+        <p:nvSpPr>
+          <p:cNvPr id="7" name="Abgerundetes Rechteck 6"/>
+          <p:cNvSpPr/>
+          <p:nvPr/>
+        </p:nvSpPr>
+        <p:spPr>
+          <a:xfrm>
+            <a:off x="5860753" y="497091"/>
+            <a:ext cx="736430" cy="171834"/>
+          </a:xfrm>
+          <a:prstGeom prst="roundRect">
+            <a:avLst/>
+          </a:prstGeom>
+        </p:spPr>
+        <p:style>
+          <a:lnRef idx="2">
+            <a:schemeClr val="accent3">
+              <a:shade val="50000"/>
+            </a:schemeClr>
+          </a:lnRef>
+          <a:fillRef idx="1">
+            <a:schemeClr val="accent3"/>
+          </a:fillRef>
+          <a:effectRef idx="0">
+            <a:schemeClr val="accent3"/>
+          </a:effectRef>
+          <a:fontRef idx="minor">
+            <a:schemeClr val="lt1"/>
+          </a:fontRef>
+        </p:style>
+        <p:txBody>
+          <a:bodyPr rtlCol="0" anchor="ctr"/>
+          <a:lstStyle/>
+          <a:p>
+            <a:pPr algn="ctr"/>
+            <a:endParaRPr lang="de-CH"/>
+          </a:p>
+        </p:txBody>
+      </p:sp>
+      <p:sp>
+        <p:nvSpPr>
+          <p:cNvPr id="8" name="Abgerundetes Rechteck 7"/>
+          <p:cNvSpPr/>
+          <p:nvPr/>
+        </p:nvSpPr>
+        <p:spPr>
+          <a:xfrm>
+            <a:off x="6597183" y="497091"/>
+            <a:ext cx="736430" cy="171834"/>
+          </a:xfrm>
+          <a:prstGeom prst="roundRect">
+            <a:avLst/>
+          </a:prstGeom>
+        </p:spPr>
+        <p:style>
+          <a:lnRef idx="2">
+            <a:schemeClr val="accent3">
+              <a:shade val="50000"/>
+            </a:schemeClr>
+          </a:lnRef>
+          <a:fillRef idx="1">
+            <a:schemeClr val="accent3"/>
+          </a:fillRef>
+          <a:effectRef idx="0">
+            <a:schemeClr val="accent3"/>
+          </a:effectRef>
+          <a:fontRef idx="minor">
+            <a:schemeClr val="lt1"/>
+          </a:fontRef>
+        </p:style>
+        <p:txBody>
+          <a:bodyPr rtlCol="0" anchor="ctr"/>
+          <a:lstStyle/>
+          <a:p>
+            <a:pPr algn="ctr"/>
+            <a:endParaRPr lang="de-CH"/>
+          </a:p>
+        </p:txBody>
+      </p:sp>
+      <p:sp>
+        <p:nvSpPr>
+          <p:cNvPr id="9" name="Abgerundetes Rechteck 8"/>
+          <p:cNvSpPr/>
+          <p:nvPr/>
+        </p:nvSpPr>
+        <p:spPr>
+          <a:xfrm>
+            <a:off x="7333613" y="497091"/>
+            <a:ext cx="736430" cy="171834"/>
+          </a:xfrm>
+          <a:prstGeom prst="roundRect">
+            <a:avLst/>
+          </a:prstGeom>
+        </p:spPr>
+        <p:style>
+          <a:lnRef idx="2">
+            <a:schemeClr val="accent3">
+              <a:shade val="50000"/>
+            </a:schemeClr>
+          </a:lnRef>
+          <a:fillRef idx="1">
+            <a:schemeClr val="accent3"/>
+          </a:fillRef>
+          <a:effectRef idx="0">
+            <a:schemeClr val="accent3"/>
+          </a:effectRef>
+          <a:fontRef idx="minor">
+            <a:schemeClr val="lt1"/>
+          </a:fontRef>
+        </p:style>
+        <p:txBody>
+          <a:bodyPr rtlCol="0" anchor="ctr"/>
+          <a:lstStyle/>
+          <a:p>
+            <a:pPr algn="ctr"/>
+            <a:endParaRPr lang="de-CH"/>
+          </a:p>
+        </p:txBody>
+      </p:sp>
+      <p:sp>
+        <p:nvSpPr>
+          <p:cNvPr id="10" name="Abgerundetes Rechteck 9"/>
+          <p:cNvSpPr/>
+          <p:nvPr/>
+        </p:nvSpPr>
+        <p:spPr>
+          <a:xfrm>
+            <a:off x="4387893" y="699610"/>
+            <a:ext cx="736430" cy="171834"/>
+          </a:xfrm>
+          <a:prstGeom prst="roundRect">
+            <a:avLst/>
+          </a:prstGeom>
+        </p:spPr>
+        <p:style>
+          <a:lnRef idx="2">
+            <a:schemeClr val="accent3">
+              <a:shade val="50000"/>
+            </a:schemeClr>
+          </a:lnRef>
+          <a:fillRef idx="1">
+            <a:schemeClr val="accent3"/>
+          </a:fillRef>
+          <a:effectRef idx="0">
+            <a:schemeClr val="accent3"/>
+          </a:effectRef>
+          <a:fontRef idx="minor">
+            <a:schemeClr val="lt1"/>
+          </a:fontRef>
+        </p:style>
+        <p:txBody>
+          <a:bodyPr rtlCol="0" anchor="ctr"/>
+          <a:lstStyle/>
+          <a:p>
+            <a:pPr algn="ctr"/>
+            <a:endParaRPr lang="de-CH"/>
+          </a:p>
+        </p:txBody>
+      </p:sp>
+      <p:sp>
+        <p:nvSpPr>
+          <p:cNvPr id="11" name="Abgerundetes Rechteck 10"/>
+          <p:cNvSpPr/>
+          <p:nvPr/>
+        </p:nvSpPr>
+        <p:spPr>
+          <a:xfrm>
+            <a:off x="5124323" y="699610"/>
+            <a:ext cx="736430" cy="171834"/>
+          </a:xfrm>
+          <a:prstGeom prst="roundRect">
+            <a:avLst/>
+          </a:prstGeom>
+        </p:spPr>
+        <p:style>
+          <a:lnRef idx="2">
+            <a:schemeClr val="accent3">
+              <a:shade val="50000"/>
+            </a:schemeClr>
+          </a:lnRef>
+          <a:fillRef idx="1">
+            <a:schemeClr val="accent3"/>
+          </a:fillRef>
+          <a:effectRef idx="0">
+            <a:schemeClr val="accent3"/>
+          </a:effectRef>
+          <a:fontRef idx="minor">
+            <a:schemeClr val="lt1"/>
+          </a:fontRef>
+        </p:style>
+        <p:txBody>
+          <a:bodyPr rtlCol="0" anchor="ctr"/>
+          <a:lstStyle/>
+          <a:p>
+            <a:pPr algn="ctr"/>
+            <a:endParaRPr lang="de-CH"/>
+          </a:p>
+        </p:txBody>
+      </p:sp>
+      <p:sp>
+        <p:nvSpPr>
+          <p:cNvPr id="12" name="Abgerundetes Rechteck 11"/>
+          <p:cNvSpPr/>
+          <p:nvPr/>
+        </p:nvSpPr>
+        <p:spPr>
+          <a:xfrm>
+            <a:off x="5860753" y="699610"/>
+            <a:ext cx="736430" cy="171834"/>
+          </a:xfrm>
+          <a:prstGeom prst="roundRect">
+            <a:avLst/>
+          </a:prstGeom>
+        </p:spPr>
+        <p:style>
+          <a:lnRef idx="2">
+            <a:schemeClr val="accent3">
+              <a:shade val="50000"/>
+            </a:schemeClr>
+          </a:lnRef>
+          <a:fillRef idx="1">
+            <a:schemeClr val="accent3"/>
+          </a:fillRef>
+          <a:effectRef idx="0">
+            <a:schemeClr val="accent3"/>
+          </a:effectRef>
+          <a:fontRef idx="minor">
+            <a:schemeClr val="lt1"/>
+          </a:fontRef>
+        </p:style>
+        <p:txBody>
+          <a:bodyPr rtlCol="0" anchor="ctr"/>
+          <a:lstStyle/>
+          <a:p>
+            <a:pPr algn="ctr"/>
+            <a:endParaRPr lang="de-CH"/>
+          </a:p>
+        </p:txBody>
+      </p:sp>
+      <p:sp>
+        <p:nvSpPr>
+          <p:cNvPr id="13" name="Abgerundetes Rechteck 12"/>
+          <p:cNvSpPr/>
+          <p:nvPr/>
+        </p:nvSpPr>
+        <p:spPr>
+          <a:xfrm>
+            <a:off x="6597183" y="699610"/>
+            <a:ext cx="736430" cy="171834"/>
+          </a:xfrm>
+          <a:prstGeom prst="roundRect">
+            <a:avLst/>
+          </a:prstGeom>
+        </p:spPr>
+        <p:style>
+          <a:lnRef idx="2">
+            <a:schemeClr val="accent3">
+              <a:shade val="50000"/>
+            </a:schemeClr>
+          </a:lnRef>
+          <a:fillRef idx="1">
+            <a:schemeClr val="accent3"/>
+          </a:fillRef>
+          <a:effectRef idx="0">
+            <a:schemeClr val="accent3"/>
+          </a:effectRef>
+          <a:fontRef idx="minor">
+            <a:schemeClr val="lt1"/>
+          </a:fontRef>
+        </p:style>
+        <p:txBody>
+          <a:bodyPr rtlCol="0" anchor="ctr"/>
+          <a:lstStyle/>
+          <a:p>
+            <a:pPr algn="ctr"/>
+            <a:endParaRPr lang="de-CH"/>
+          </a:p>
+        </p:txBody>
+      </p:sp>
+      <p:sp>
+        <p:nvSpPr>
+          <p:cNvPr id="14" name="Abgerundetes Rechteck 13"/>
+          <p:cNvSpPr/>
+          <p:nvPr/>
+        </p:nvSpPr>
+        <p:spPr>
+          <a:xfrm>
+            <a:off x="7333613" y="699610"/>
+            <a:ext cx="736430" cy="171834"/>
+          </a:xfrm>
+          <a:prstGeom prst="roundRect">
+            <a:avLst/>
+          </a:prstGeom>
+        </p:spPr>
+        <p:style>
+          <a:lnRef idx="2">
+            <a:schemeClr val="accent3">
+              <a:shade val="50000"/>
+            </a:schemeClr>
+          </a:lnRef>
+          <a:fillRef idx="1">
+            <a:schemeClr val="accent3"/>
+          </a:fillRef>
+          <a:effectRef idx="0">
+            <a:schemeClr val="accent3"/>
+          </a:effectRef>
+          <a:fontRef idx="minor">
+            <a:schemeClr val="lt1"/>
+          </a:fontRef>
+        </p:style>
+        <p:txBody>
+          <a:bodyPr rtlCol="0" anchor="ctr"/>
+          <a:lstStyle/>
+          <a:p>
+            <a:pPr algn="ctr"/>
+            <a:endParaRPr lang="de-CH"/>
+          </a:p>
+        </p:txBody>
+      </p:sp>
+      <p:sp>
+        <p:nvSpPr>
+          <p:cNvPr id="15" name="Rechteck 14"/>
+          <p:cNvSpPr/>
+          <p:nvPr/>
+        </p:nvSpPr>
+        <p:spPr>
+          <a:xfrm>
+            <a:off x="4387892" y="932811"/>
+            <a:ext cx="5228649" cy="3669874"/>
+          </a:xfrm>
+          <a:prstGeom prst="rect">
+            <a:avLst/>
+          </a:prstGeom>
+        </p:spPr>
+        <p:style>
+          <a:lnRef idx="2">
+            <a:schemeClr val="accent3">
+              <a:shade val="50000"/>
+            </a:schemeClr>
+          </a:lnRef>
+          <a:fillRef idx="1">
+            <a:schemeClr val="accent3"/>
+          </a:fillRef>
+          <a:effectRef idx="0">
+            <a:schemeClr val="accent3"/>
+          </a:effectRef>
+          <a:fontRef idx="minor">
+            <a:schemeClr val="lt1"/>
+          </a:fontRef>
+        </p:style>
+        <p:txBody>
+          <a:bodyPr rtlCol="0" anchor="ctr"/>
+          <a:lstStyle/>
+          <a:p>
+            <a:pPr algn="ctr"/>
+            <a:endParaRPr lang="de-CH"/>
+          </a:p>
+        </p:txBody>
+      </p:sp>
+      <p:sp>
+        <p:nvSpPr>
+          <p:cNvPr id="16" name="Abgerundetes Rechteck 15"/>
+          <p:cNvSpPr/>
+          <p:nvPr/>
+        </p:nvSpPr>
+        <p:spPr>
+          <a:xfrm>
+            <a:off x="4387892" y="4740766"/>
+            <a:ext cx="1405354" cy="171834"/>
+          </a:xfrm>
+          <a:prstGeom prst="roundRect">
+            <a:avLst/>
+          </a:prstGeom>
+        </p:spPr>
+        <p:style>
+          <a:lnRef idx="2">
+            <a:schemeClr val="accent3">
+              <a:shade val="50000"/>
+            </a:schemeClr>
+          </a:lnRef>
+          <a:fillRef idx="1">
+            <a:schemeClr val="accent3"/>
+          </a:fillRef>
+          <a:effectRef idx="0">
+            <a:schemeClr val="accent3"/>
+          </a:effectRef>
+          <a:fontRef idx="minor">
+            <a:schemeClr val="lt1"/>
+          </a:fontRef>
+        </p:style>
+        <p:txBody>
+          <a:bodyPr rtlCol="0" anchor="ctr"/>
+          <a:lstStyle/>
+          <a:p>
+            <a:pPr algn="ctr"/>
+            <a:r>
+              <a:rPr lang="de-CH" sz="1000" dirty="0" err="1" smtClean="0"/>
+              <a:t>FontSize</a:t>
+            </a:r>
+            <a:endParaRPr lang="de-CH" sz="1000" dirty="0"/>
+          </a:p>
+        </p:txBody>
+      </p:sp>
+      <p:sp>
+        <p:nvSpPr>
+          <p:cNvPr id="22" name="Abgerundetes Rechteck 21"/>
+          <p:cNvSpPr/>
+          <p:nvPr/>
+        </p:nvSpPr>
+        <p:spPr>
+          <a:xfrm>
+            <a:off x="5839270" y="4740766"/>
+            <a:ext cx="1405354" cy="171834"/>
+          </a:xfrm>
+          <a:prstGeom prst="roundRect">
+            <a:avLst/>
+          </a:prstGeom>
+        </p:spPr>
+        <p:style>
+          <a:lnRef idx="2">
+            <a:schemeClr val="accent3">
+              <a:shade val="50000"/>
+            </a:schemeClr>
+          </a:lnRef>
+          <a:fillRef idx="1">
+            <a:schemeClr val="accent3"/>
+          </a:fillRef>
+          <a:effectRef idx="0">
+            <a:schemeClr val="accent3"/>
+          </a:effectRef>
+          <a:fontRef idx="minor">
+            <a:schemeClr val="lt1"/>
+          </a:fontRef>
+        </p:style>
+        <p:txBody>
+          <a:bodyPr rtlCol="0" anchor="ctr"/>
+          <a:lstStyle/>
+          <a:p>
+            <a:pPr algn="ctr"/>
+            <a:r>
+              <a:rPr lang="de-CH" sz="1000" dirty="0" smtClean="0"/>
+              <a:t>Condensed</a:t>
+            </a:r>
+            <a:endParaRPr lang="de-CH" sz="1000" dirty="0"/>
+          </a:p>
+        </p:txBody>
+      </p:sp>
+      <p:sp>
+        <p:nvSpPr>
+          <p:cNvPr id="23" name="Abgerundetes Rechteck 22"/>
+          <p:cNvSpPr/>
+          <p:nvPr/>
+        </p:nvSpPr>
+        <p:spPr>
+          <a:xfrm>
+            <a:off x="4387892" y="4932543"/>
+            <a:ext cx="1405354" cy="171834"/>
+          </a:xfrm>
+          <a:prstGeom prst="roundRect">
+            <a:avLst/>
+          </a:prstGeom>
+        </p:spPr>
+        <p:style>
+          <a:lnRef idx="2">
+            <a:schemeClr val="accent3">
+              <a:shade val="50000"/>
+            </a:schemeClr>
+          </a:lnRef>
+          <a:fillRef idx="1">
+            <a:schemeClr val="accent3"/>
+          </a:fillRef>
+          <a:effectRef idx="0">
+            <a:schemeClr val="accent3"/>
+          </a:effectRef>
+          <a:fontRef idx="minor">
+            <a:schemeClr val="lt1"/>
+          </a:fontRef>
+        </p:style>
+        <p:txBody>
+          <a:bodyPr rtlCol="0" anchor="ctr"/>
+          <a:lstStyle/>
+          <a:p>
+            <a:pPr algn="ctr"/>
+            <a:r>
+              <a:rPr lang="de-CH" sz="1000" dirty="0" smtClean="0"/>
+              <a:t>Bar</a:t>
+            </a:r>
+            <a:endParaRPr lang="de-CH" sz="1000" dirty="0"/>
+          </a:p>
+        </p:txBody>
+      </p:sp>
+      <p:sp>
+        <p:nvSpPr>
+          <p:cNvPr id="24" name="Abgerundetes Rechteck 23"/>
+          <p:cNvSpPr/>
+          <p:nvPr/>
+        </p:nvSpPr>
+        <p:spPr>
+          <a:xfrm>
+            <a:off x="5839270" y="4932543"/>
+            <a:ext cx="1405354" cy="171834"/>
+          </a:xfrm>
+          <a:prstGeom prst="roundRect">
+            <a:avLst/>
+          </a:prstGeom>
+        </p:spPr>
+        <p:style>
+          <a:lnRef idx="2">
+            <a:schemeClr val="accent3">
+              <a:shade val="50000"/>
+            </a:schemeClr>
+          </a:lnRef>
+          <a:fillRef idx="1">
+            <a:schemeClr val="accent3"/>
+          </a:fillRef>
+          <a:effectRef idx="0">
+            <a:schemeClr val="accent3"/>
+          </a:effectRef>
+          <a:fontRef idx="minor">
+            <a:schemeClr val="lt1"/>
+          </a:fontRef>
+        </p:style>
+        <p:txBody>
+          <a:bodyPr rtlCol="0" anchor="ctr"/>
+          <a:lstStyle/>
+          <a:p>
+            <a:pPr algn="ctr"/>
+            <a:r>
+              <a:rPr lang="de-CH" sz="1000" dirty="0" smtClean="0"/>
+              <a:t>Top </a:t>
+            </a:r>
+            <a:r>
+              <a:rPr lang="de-CH" sz="1000" dirty="0" err="1" smtClean="0"/>
+              <a:t>bound</a:t>
+            </a:r>
+            <a:endParaRPr lang="de-CH" sz="1000" dirty="0"/>
+          </a:p>
+        </p:txBody>
+      </p:sp>
+      <p:sp>
+        <p:nvSpPr>
+          <p:cNvPr id="25" name="Abgerundetes Rechteck 24"/>
+          <p:cNvSpPr/>
+          <p:nvPr/>
+        </p:nvSpPr>
+        <p:spPr>
+          <a:xfrm>
+            <a:off x="7290648" y="4740766"/>
+            <a:ext cx="1405354" cy="171834"/>
+          </a:xfrm>
+          <a:prstGeom prst="roundRect">
+            <a:avLst/>
+          </a:prstGeom>
+        </p:spPr>
+        <p:style>
+          <a:lnRef idx="2">
+            <a:schemeClr val="accent3">
+              <a:shade val="50000"/>
+            </a:schemeClr>
+          </a:lnRef>
+          <a:fillRef idx="1">
+            <a:schemeClr val="accent3"/>
+          </a:fillRef>
+          <a:effectRef idx="0">
+            <a:schemeClr val="accent3"/>
+          </a:effectRef>
+          <a:fontRef idx="minor">
+            <a:schemeClr val="lt1"/>
+          </a:fontRef>
+        </p:style>
+        <p:txBody>
+          <a:bodyPr rtlCol="0" anchor="ctr"/>
+          <a:lstStyle/>
+          <a:p>
+            <a:pPr algn="ctr"/>
+            <a:r>
+              <a:rPr lang="de-CH" sz="1000" dirty="0" err="1" smtClean="0"/>
+              <a:t>Opacity</a:t>
+            </a:r>
+            <a:endParaRPr lang="de-CH" sz="1000" dirty="0"/>
+          </a:p>
+        </p:txBody>
+      </p:sp>
+      <p:sp>
+        <p:nvSpPr>
+          <p:cNvPr id="26" name="Abgerundetes Rechteck 25"/>
+          <p:cNvSpPr/>
+          <p:nvPr/>
+        </p:nvSpPr>
+        <p:spPr>
+          <a:xfrm>
+            <a:off x="4387893" y="5156541"/>
+            <a:ext cx="2534546" cy="171834"/>
+          </a:xfrm>
+          <a:prstGeom prst="roundRect">
+            <a:avLst/>
+          </a:prstGeom>
+        </p:spPr>
+        <p:style>
+          <a:lnRef idx="2">
+            <a:schemeClr val="accent2">
+              <a:shade val="50000"/>
+            </a:schemeClr>
+          </a:lnRef>
+          <a:fillRef idx="1">
+            <a:schemeClr val="accent2"/>
+          </a:fillRef>
+          <a:effectRef idx="0">
+            <a:schemeClr val="accent2"/>
+          </a:effectRef>
+          <a:fontRef idx="minor">
+            <a:schemeClr val="lt1"/>
+          </a:fontRef>
+        </p:style>
+        <p:txBody>
+          <a:bodyPr rtlCol="0" anchor="ctr"/>
+          <a:lstStyle/>
+          <a:p>
+            <a:pPr algn="ctr"/>
+            <a:r>
+              <a:rPr lang="de-CH" sz="1000" dirty="0" err="1" smtClean="0"/>
+              <a:t>BackgroundFile</a:t>
+            </a:r>
+            <a:endParaRPr lang="de-CH" sz="1000" dirty="0"/>
+          </a:p>
+        </p:txBody>
+      </p:sp>
+      <p:sp>
+        <p:nvSpPr>
+          <p:cNvPr id="27" name="Abgerundetes Rechteck 26"/>
+          <p:cNvSpPr/>
+          <p:nvPr/>
+        </p:nvSpPr>
+        <p:spPr>
+          <a:xfrm>
+            <a:off x="6965399" y="5156541"/>
+            <a:ext cx="279226" cy="171834"/>
+          </a:xfrm>
+          <a:prstGeom prst="roundRect">
+            <a:avLst/>
+          </a:prstGeom>
+          <a:solidFill>
+            <a:schemeClr val="accent4">
+              <a:lumMod val="40000"/>
+              <a:lumOff val="60000"/>
+            </a:schemeClr>
+          </a:solidFill>
+        </p:spPr>
+        <p:style>
+          <a:lnRef idx="2">
+            <a:schemeClr val="accent3">
+              <a:shade val="50000"/>
+            </a:schemeClr>
+          </a:lnRef>
+          <a:fillRef idx="1">
+            <a:schemeClr val="accent3"/>
+          </a:fillRef>
+          <a:effectRef idx="0">
+            <a:schemeClr val="accent3"/>
+          </a:effectRef>
+          <a:fontRef idx="minor">
+            <a:schemeClr val="lt1"/>
+          </a:fontRef>
+        </p:style>
+        <p:txBody>
+          <a:bodyPr rtlCol="0" anchor="ctr"/>
+          <a:lstStyle/>
+          <a:p>
+            <a:pPr algn="ctr"/>
+            <a:r>
+              <a:rPr lang="de-CH" sz="1000" dirty="0" smtClean="0">
+                <a:solidFill>
+                  <a:schemeClr val="tx1"/>
+                </a:solidFill>
+              </a:rPr>
+              <a:t>…</a:t>
+            </a:r>
+            <a:endParaRPr lang="de-CH" sz="1000" dirty="0">
+              <a:solidFill>
+                <a:schemeClr val="tx1"/>
+              </a:solidFill>
+            </a:endParaRPr>
+          </a:p>
+        </p:txBody>
+      </p:sp>
+      <p:sp>
+        <p:nvSpPr>
+          <p:cNvPr id="28" name="Abgerundetes Rechteck 27"/>
+          <p:cNvSpPr/>
+          <p:nvPr/>
+        </p:nvSpPr>
+        <p:spPr>
+          <a:xfrm>
+            <a:off x="4323453" y="5543166"/>
+            <a:ext cx="1405354" cy="171834"/>
+          </a:xfrm>
+          <a:prstGeom prst="roundRect">
+            <a:avLst/>
+          </a:prstGeom>
+        </p:spPr>
+        <p:style>
+          <a:lnRef idx="2">
+            <a:schemeClr val="accent3">
+              <a:shade val="50000"/>
+            </a:schemeClr>
+          </a:lnRef>
+          <a:fillRef idx="1">
+            <a:schemeClr val="accent3"/>
+          </a:fillRef>
+          <a:effectRef idx="0">
+            <a:schemeClr val="accent3"/>
+          </a:effectRef>
+          <a:fontRef idx="minor">
+            <a:schemeClr val="lt1"/>
+          </a:fontRef>
+        </p:style>
+        <p:txBody>
+          <a:bodyPr rtlCol="0" anchor="ctr"/>
+          <a:lstStyle/>
+          <a:p>
+            <a:pPr algn="ctr"/>
+            <a:r>
+              <a:rPr lang="de-CH" sz="1000" dirty="0" smtClean="0"/>
+              <a:t>Output Device</a:t>
+            </a:r>
+            <a:endParaRPr lang="de-CH" sz="1000" dirty="0"/>
+          </a:p>
+        </p:txBody>
+      </p:sp>
+      <p:sp>
+        <p:nvSpPr>
+          <p:cNvPr id="29" name="Abgerundetes Rechteck 28"/>
+          <p:cNvSpPr/>
+          <p:nvPr/>
+        </p:nvSpPr>
+        <p:spPr>
+          <a:xfrm>
+            <a:off x="4323453" y="5759492"/>
+            <a:ext cx="1405354" cy="171834"/>
+          </a:xfrm>
+          <a:prstGeom prst="roundRect">
+            <a:avLst/>
+          </a:prstGeom>
+        </p:spPr>
+        <p:style>
+          <a:lnRef idx="2">
+            <a:schemeClr val="accent3">
+              <a:shade val="50000"/>
+            </a:schemeClr>
+          </a:lnRef>
+          <a:fillRef idx="1">
+            <a:schemeClr val="accent3"/>
+          </a:fillRef>
+          <a:effectRef idx="0">
+            <a:schemeClr val="accent3"/>
+          </a:effectRef>
+          <a:fontRef idx="minor">
+            <a:schemeClr val="lt1"/>
+          </a:fontRef>
+        </p:style>
+        <p:txBody>
+          <a:bodyPr rtlCol="0" anchor="ctr"/>
+          <a:lstStyle/>
+          <a:p>
+            <a:pPr algn="ctr"/>
+            <a:r>
+              <a:rPr lang="de-CH" sz="1000" dirty="0" smtClean="0"/>
+              <a:t>Voice</a:t>
+            </a:r>
+            <a:endParaRPr lang="de-CH" sz="1000" dirty="0"/>
+          </a:p>
+        </p:txBody>
+      </p:sp>
+      <p:sp>
+        <p:nvSpPr>
+          <p:cNvPr id="31" name="Rechteck 30"/>
+          <p:cNvSpPr/>
+          <p:nvPr/>
+        </p:nvSpPr>
+        <p:spPr>
+          <a:xfrm>
+            <a:off x="9825197" y="435722"/>
+            <a:ext cx="1393080" cy="2442490"/>
+          </a:xfrm>
+          <a:prstGeom prst="rect">
+            <a:avLst/>
+          </a:prstGeom>
+        </p:spPr>
+        <p:style>
+          <a:lnRef idx="2">
+            <a:schemeClr val="accent1">
+              <a:shade val="50000"/>
+            </a:schemeClr>
+          </a:lnRef>
+          <a:fillRef idx="1">
+            <a:schemeClr val="accent1"/>
+          </a:fillRef>
+          <a:effectRef idx="0">
+            <a:schemeClr val="accent1"/>
+          </a:effectRef>
+          <a:fontRef idx="minor">
+            <a:schemeClr val="lt1"/>
+          </a:fontRef>
+        </p:style>
+        <p:txBody>
+          <a:bodyPr rtlCol="0" anchor="t"/>
+          <a:lstStyle/>
+          <a:p>
+            <a:pPr algn="ctr"/>
+            <a:r>
+              <a:rPr lang="de-CH" dirty="0" err="1" smtClean="0"/>
+              <a:t>Callouts</a:t>
+            </a:r>
+            <a:endParaRPr lang="de-CH" dirty="0"/>
+          </a:p>
+        </p:txBody>
+      </p:sp>
+      <p:sp>
+        <p:nvSpPr>
+          <p:cNvPr id="32" name="Abgerundetes Rechteck 31"/>
+          <p:cNvSpPr/>
+          <p:nvPr/>
+        </p:nvSpPr>
+        <p:spPr>
+          <a:xfrm>
+            <a:off x="5839270" y="5543166"/>
+            <a:ext cx="1405354" cy="171834"/>
+          </a:xfrm>
+          <a:prstGeom prst="roundRect">
+            <a:avLst/>
+          </a:prstGeom>
+        </p:spPr>
+        <p:style>
+          <a:lnRef idx="2">
+            <a:schemeClr val="accent3">
+              <a:shade val="50000"/>
+            </a:schemeClr>
+          </a:lnRef>
+          <a:fillRef idx="1">
+            <a:schemeClr val="accent3"/>
+          </a:fillRef>
+          <a:effectRef idx="0">
+            <a:schemeClr val="accent3"/>
+          </a:effectRef>
+          <a:fontRef idx="minor">
+            <a:schemeClr val="lt1"/>
+          </a:fontRef>
+        </p:style>
+        <p:txBody>
+          <a:bodyPr rtlCol="0" anchor="ctr"/>
+          <a:lstStyle/>
+          <a:p>
+            <a:pPr algn="ctr"/>
+            <a:r>
+              <a:rPr lang="de-CH" sz="1000" dirty="0" smtClean="0"/>
+              <a:t>Backup</a:t>
+            </a:r>
+            <a:endParaRPr lang="de-CH" sz="1000" dirty="0"/>
+          </a:p>
+        </p:txBody>
+      </p:sp>
+      <p:sp>
+        <p:nvSpPr>
+          <p:cNvPr id="33" name="Abgerundetes Rechteck 32"/>
+          <p:cNvSpPr/>
+          <p:nvPr/>
+        </p:nvSpPr>
+        <p:spPr>
+          <a:xfrm>
+            <a:off x="5839270" y="5751821"/>
+            <a:ext cx="1405354" cy="171834"/>
+          </a:xfrm>
+          <a:prstGeom prst="roundRect">
+            <a:avLst/>
+          </a:prstGeom>
+        </p:spPr>
+        <p:style>
+          <a:lnRef idx="2">
+            <a:schemeClr val="accent6">
+              <a:shade val="50000"/>
+            </a:schemeClr>
+          </a:lnRef>
+          <a:fillRef idx="1">
+            <a:schemeClr val="accent6"/>
+          </a:fillRef>
+          <a:effectRef idx="0">
+            <a:schemeClr val="accent6"/>
+          </a:effectRef>
+          <a:fontRef idx="minor">
+            <a:schemeClr val="lt1"/>
+          </a:fontRef>
+        </p:style>
+        <p:txBody>
+          <a:bodyPr rtlCol="0" anchor="ctr"/>
+          <a:lstStyle/>
+          <a:p>
+            <a:pPr algn="ctr"/>
+            <a:r>
+              <a:rPr lang="de-CH" sz="1000" dirty="0" smtClean="0"/>
+              <a:t>Recorder</a:t>
+            </a:r>
+            <a:endParaRPr lang="de-CH" sz="1000" dirty="0"/>
+          </a:p>
+        </p:txBody>
+      </p:sp>
+      <p:sp>
+        <p:nvSpPr>
+          <p:cNvPr id="34" name="Abgerundetes Rechteck 33"/>
+          <p:cNvSpPr/>
+          <p:nvPr/>
+        </p:nvSpPr>
+        <p:spPr>
+          <a:xfrm>
+            <a:off x="7290648" y="4931779"/>
+            <a:ext cx="1405354" cy="171834"/>
+          </a:xfrm>
+          <a:prstGeom prst="roundRect">
+            <a:avLst/>
+          </a:prstGeom>
+        </p:spPr>
+        <p:style>
+          <a:lnRef idx="2">
+            <a:schemeClr val="accent2">
+              <a:shade val="50000"/>
+            </a:schemeClr>
+          </a:lnRef>
+          <a:fillRef idx="1">
+            <a:schemeClr val="accent2"/>
+          </a:fillRef>
+          <a:effectRef idx="0">
+            <a:schemeClr val="accent2"/>
+          </a:effectRef>
+          <a:fontRef idx="minor">
+            <a:schemeClr val="lt1"/>
+          </a:fontRef>
+        </p:style>
+        <p:txBody>
+          <a:bodyPr rtlCol="0" anchor="ctr"/>
+          <a:lstStyle/>
+          <a:p>
+            <a:pPr algn="ctr"/>
+            <a:r>
+              <a:rPr lang="de-CH" sz="1000" dirty="0" err="1" smtClean="0"/>
+              <a:t>Hotkey</a:t>
+            </a:r>
+            <a:endParaRPr lang="de-CH" sz="1000" dirty="0"/>
+          </a:p>
+        </p:txBody>
+      </p:sp>
+      <p:sp>
+        <p:nvSpPr>
+          <p:cNvPr id="35" name="Rechteck 34"/>
+          <p:cNvSpPr/>
+          <p:nvPr/>
+        </p:nvSpPr>
+        <p:spPr>
+          <a:xfrm>
+            <a:off x="9825197" y="2970265"/>
+            <a:ext cx="1393080" cy="2442491"/>
+          </a:xfrm>
+          <a:prstGeom prst="rect">
+            <a:avLst/>
+          </a:prstGeom>
+        </p:spPr>
+        <p:style>
+          <a:lnRef idx="2">
+            <a:schemeClr val="accent1">
+              <a:shade val="50000"/>
+            </a:schemeClr>
+          </a:lnRef>
+          <a:fillRef idx="1">
+            <a:schemeClr val="accent1"/>
+          </a:fillRef>
+          <a:effectRef idx="0">
+            <a:schemeClr val="accent1"/>
+          </a:effectRef>
+          <a:fontRef idx="minor">
+            <a:schemeClr val="lt1"/>
+          </a:fontRef>
+        </p:style>
+        <p:txBody>
+          <a:bodyPr rtlCol="0" anchor="t"/>
+          <a:lstStyle/>
+          <a:p>
+            <a:pPr algn="ctr"/>
+            <a:r>
+              <a:rPr lang="de-CH" dirty="0" err="1" smtClean="0"/>
+              <a:t>Hotkeys</a:t>
+            </a:r>
+            <a:endParaRPr lang="de-CH" dirty="0"/>
+          </a:p>
+        </p:txBody>
+      </p:sp>
+      <p:sp>
+        <p:nvSpPr>
+          <p:cNvPr id="36" name="Abgerundetes Rechteck 35"/>
+          <p:cNvSpPr/>
+          <p:nvPr/>
+        </p:nvSpPr>
+        <p:spPr>
+          <a:xfrm>
+            <a:off x="9895771" y="3376835"/>
+            <a:ext cx="1251931" cy="171834"/>
+          </a:xfrm>
+          <a:prstGeom prst="roundRect">
+            <a:avLst/>
+          </a:prstGeom>
+        </p:spPr>
+        <p:style>
+          <a:lnRef idx="2">
+            <a:schemeClr val="accent6">
+              <a:shade val="50000"/>
+            </a:schemeClr>
+          </a:lnRef>
+          <a:fillRef idx="1">
+            <a:schemeClr val="accent6"/>
+          </a:fillRef>
+          <a:effectRef idx="0">
+            <a:schemeClr val="accent6"/>
+          </a:effectRef>
+          <a:fontRef idx="minor">
+            <a:schemeClr val="lt1"/>
+          </a:fontRef>
+        </p:style>
+        <p:txBody>
+          <a:bodyPr rtlCol="0" anchor="ctr"/>
+          <a:lstStyle/>
+          <a:p>
+            <a:pPr algn="ctr"/>
+            <a:r>
+              <a:rPr lang="de-CH" sz="1000" dirty="0" smtClean="0"/>
+              <a:t>Keyboard</a:t>
+            </a:r>
+            <a:endParaRPr lang="de-CH" sz="1000" dirty="0"/>
+          </a:p>
+        </p:txBody>
+      </p:sp>
+      <p:sp>
+        <p:nvSpPr>
+          <p:cNvPr id="37" name="Abgerundetes Rechteck 36"/>
+          <p:cNvSpPr/>
+          <p:nvPr/>
+        </p:nvSpPr>
+        <p:spPr>
+          <a:xfrm>
+            <a:off x="9894236" y="3582422"/>
+            <a:ext cx="1251931" cy="171834"/>
+          </a:xfrm>
+          <a:prstGeom prst="roundRect">
+            <a:avLst/>
+          </a:prstGeom>
+        </p:spPr>
+        <p:style>
+          <a:lnRef idx="2">
+            <a:schemeClr val="accent6">
+              <a:shade val="50000"/>
+            </a:schemeClr>
+          </a:lnRef>
+          <a:fillRef idx="1">
+            <a:schemeClr val="accent6"/>
+          </a:fillRef>
+          <a:effectRef idx="0">
+            <a:schemeClr val="accent6"/>
+          </a:effectRef>
+          <a:fontRef idx="minor">
+            <a:schemeClr val="lt1"/>
+          </a:fontRef>
+        </p:style>
+        <p:txBody>
+          <a:bodyPr rtlCol="0" anchor="ctr"/>
+          <a:lstStyle/>
+          <a:p>
+            <a:pPr algn="ctr"/>
+            <a:r>
+              <a:rPr lang="de-CH" sz="1000" dirty="0" smtClean="0"/>
+              <a:t>MSFS</a:t>
+            </a:r>
+            <a:endParaRPr lang="de-CH" sz="1000" dirty="0"/>
+          </a:p>
+        </p:txBody>
+      </p:sp>
+      <p:sp>
+        <p:nvSpPr>
+          <p:cNvPr id="38" name="Abgerundetes Rechteck 37"/>
+          <p:cNvSpPr/>
+          <p:nvPr/>
+        </p:nvSpPr>
+        <p:spPr>
+          <a:xfrm>
+            <a:off x="9883498" y="3844010"/>
+            <a:ext cx="1262669" cy="171834"/>
+          </a:xfrm>
+          <a:prstGeom prst="roundRect">
+            <a:avLst/>
+          </a:prstGeom>
+        </p:spPr>
+        <p:style>
+          <a:lnRef idx="2">
+            <a:schemeClr val="accent2">
+              <a:shade val="50000"/>
+            </a:schemeClr>
+          </a:lnRef>
+          <a:fillRef idx="1">
+            <a:schemeClr val="accent2"/>
+          </a:fillRef>
+          <a:effectRef idx="0">
+            <a:schemeClr val="accent2"/>
+          </a:effectRef>
+          <a:fontRef idx="minor">
+            <a:schemeClr val="lt1"/>
+          </a:fontRef>
+        </p:style>
+        <p:txBody>
+          <a:bodyPr rtlCol="0" anchor="ctr"/>
+          <a:lstStyle/>
+          <a:p>
+            <a:pPr algn="ctr"/>
+            <a:r>
+              <a:rPr lang="de-CH" sz="1000" dirty="0" smtClean="0"/>
+              <a:t>HK </a:t>
+            </a:r>
+            <a:r>
+              <a:rPr lang="de-CH" sz="1000" dirty="0" err="1" smtClean="0"/>
+              <a:t>ShowHide</a:t>
+            </a:r>
+            <a:endParaRPr lang="de-CH" sz="1000" dirty="0"/>
+          </a:p>
+        </p:txBody>
+      </p:sp>
+      <p:sp>
+        <p:nvSpPr>
+          <p:cNvPr id="39" name="Abgerundetes Rechteck 38"/>
+          <p:cNvSpPr/>
+          <p:nvPr/>
+        </p:nvSpPr>
+        <p:spPr>
+          <a:xfrm>
+            <a:off x="9894236" y="4074907"/>
+            <a:ext cx="1262669" cy="171834"/>
+          </a:xfrm>
+          <a:prstGeom prst="roundRect">
+            <a:avLst/>
+          </a:prstGeom>
+        </p:spPr>
+        <p:style>
+          <a:lnRef idx="2">
+            <a:schemeClr val="accent2">
+              <a:shade val="50000"/>
+            </a:schemeClr>
+          </a:lnRef>
+          <a:fillRef idx="1">
+            <a:schemeClr val="accent2"/>
+          </a:fillRef>
+          <a:effectRef idx="0">
+            <a:schemeClr val="accent2"/>
+          </a:effectRef>
+          <a:fontRef idx="minor">
+            <a:schemeClr val="lt1"/>
+          </a:fontRef>
+        </p:style>
+        <p:txBody>
+          <a:bodyPr rtlCol="0" anchor="ctr"/>
+          <a:lstStyle/>
+          <a:p>
+            <a:pPr algn="ctr"/>
+            <a:r>
+              <a:rPr lang="de-CH" sz="1000" dirty="0" smtClean="0"/>
+              <a:t>HK </a:t>
+            </a:r>
+            <a:r>
+              <a:rPr lang="de-CH" sz="1000" dirty="0" err="1" smtClean="0"/>
+              <a:t>FlightBag</a:t>
+            </a:r>
+            <a:endParaRPr lang="de-CH" sz="1000" dirty="0"/>
+          </a:p>
+        </p:txBody>
+      </p:sp>
+      <p:sp>
+        <p:nvSpPr>
+          <p:cNvPr id="40" name="Abgerundetes Rechteck 39"/>
+          <p:cNvSpPr/>
+          <p:nvPr/>
+        </p:nvSpPr>
+        <p:spPr>
+          <a:xfrm>
+            <a:off x="9890401" y="4295837"/>
+            <a:ext cx="1262669" cy="171834"/>
+          </a:xfrm>
+          <a:prstGeom prst="roundRect">
+            <a:avLst/>
+          </a:prstGeom>
+        </p:spPr>
+        <p:style>
+          <a:lnRef idx="2">
+            <a:schemeClr val="accent2">
+              <a:shade val="50000"/>
+            </a:schemeClr>
+          </a:lnRef>
+          <a:fillRef idx="1">
+            <a:schemeClr val="accent2"/>
+          </a:fillRef>
+          <a:effectRef idx="0">
+            <a:schemeClr val="accent2"/>
+          </a:effectRef>
+          <a:fontRef idx="minor">
+            <a:schemeClr val="lt1"/>
+          </a:fontRef>
+        </p:style>
+        <p:txBody>
+          <a:bodyPr rtlCol="0" anchor="ctr"/>
+          <a:lstStyle/>
+          <a:p>
+            <a:pPr algn="ctr"/>
+            <a:r>
+              <a:rPr lang="de-CH" sz="1000" dirty="0" smtClean="0"/>
+              <a:t>HK </a:t>
+            </a:r>
+            <a:r>
+              <a:rPr lang="de-CH" sz="1000" dirty="0" err="1" smtClean="0"/>
+              <a:t>CamCtrl</a:t>
+            </a:r>
+            <a:endParaRPr lang="de-CH" sz="1000" dirty="0"/>
+          </a:p>
+        </p:txBody>
+      </p:sp>
+      <p:sp>
+        <p:nvSpPr>
+          <p:cNvPr id="41" name="Abgerundetes Rechteck 40"/>
+          <p:cNvSpPr/>
+          <p:nvPr/>
+        </p:nvSpPr>
+        <p:spPr>
+          <a:xfrm>
+            <a:off x="9890401" y="4526734"/>
+            <a:ext cx="1262669" cy="171834"/>
+          </a:xfrm>
+          <a:prstGeom prst="roundRect">
+            <a:avLst/>
+          </a:prstGeom>
+        </p:spPr>
+        <p:style>
+          <a:lnRef idx="2">
+            <a:schemeClr val="accent2">
+              <a:shade val="50000"/>
+            </a:schemeClr>
+          </a:lnRef>
+          <a:fillRef idx="1">
+            <a:schemeClr val="accent2"/>
+          </a:fillRef>
+          <a:effectRef idx="0">
+            <a:schemeClr val="accent2"/>
+          </a:effectRef>
+          <a:fontRef idx="minor">
+            <a:schemeClr val="lt1"/>
+          </a:fontRef>
+        </p:style>
+        <p:txBody>
+          <a:bodyPr rtlCol="0" anchor="ctr"/>
+          <a:lstStyle/>
+          <a:p>
+            <a:pPr algn="ctr"/>
+            <a:r>
+              <a:rPr lang="de-CH" sz="1000" dirty="0" smtClean="0"/>
+              <a:t>HK Checklist</a:t>
+            </a:r>
+            <a:endParaRPr lang="de-CH" sz="1000" dirty="0"/>
+          </a:p>
+        </p:txBody>
+      </p:sp>
+      <p:sp>
+        <p:nvSpPr>
+          <p:cNvPr id="42" name="Abgerundetes Rechteck 41"/>
+          <p:cNvSpPr/>
+          <p:nvPr/>
+        </p:nvSpPr>
+        <p:spPr>
+          <a:xfrm>
+            <a:off x="10463436" y="5959705"/>
+            <a:ext cx="698076" cy="171834"/>
+          </a:xfrm>
+          <a:prstGeom prst="roundRect">
+            <a:avLst/>
+          </a:prstGeom>
+          <a:solidFill>
+            <a:schemeClr val="accent4">
+              <a:lumMod val="40000"/>
+              <a:lumOff val="60000"/>
+            </a:schemeClr>
+          </a:solidFill>
+        </p:spPr>
+        <p:style>
+          <a:lnRef idx="2">
+            <a:schemeClr val="accent3">
+              <a:shade val="50000"/>
+            </a:schemeClr>
+          </a:lnRef>
+          <a:fillRef idx="1">
+            <a:schemeClr val="accent3"/>
+          </a:fillRef>
+          <a:effectRef idx="0">
+            <a:schemeClr val="accent3"/>
+          </a:effectRef>
+          <a:fontRef idx="minor">
+            <a:schemeClr val="lt1"/>
+          </a:fontRef>
+        </p:style>
+        <p:txBody>
+          <a:bodyPr rtlCol="0" anchor="ctr"/>
+          <a:lstStyle/>
+          <a:p>
+            <a:pPr algn="ctr"/>
+            <a:r>
+              <a:rPr lang="de-CH" sz="1000" dirty="0" err="1" smtClean="0">
+                <a:solidFill>
+                  <a:schemeClr val="tx1"/>
+                </a:solidFill>
+              </a:rPr>
+              <a:t>Cancel</a:t>
+            </a:r>
+            <a:endParaRPr lang="de-CH" sz="1000" dirty="0">
+              <a:solidFill>
+                <a:schemeClr val="tx1"/>
+              </a:solidFill>
+            </a:endParaRPr>
+          </a:p>
+        </p:txBody>
+      </p:sp>
+      <p:sp>
+        <p:nvSpPr>
+          <p:cNvPr id="43" name="Abgerundetes Rechteck 42"/>
+          <p:cNvSpPr/>
+          <p:nvPr/>
+        </p:nvSpPr>
+        <p:spPr>
+          <a:xfrm>
+            <a:off x="9616541" y="5959705"/>
+            <a:ext cx="698076" cy="171834"/>
+          </a:xfrm>
+          <a:prstGeom prst="roundRect">
+            <a:avLst/>
+          </a:prstGeom>
+          <a:solidFill>
+            <a:schemeClr val="accent4">
+              <a:lumMod val="40000"/>
+              <a:lumOff val="60000"/>
+            </a:schemeClr>
+          </a:solidFill>
+        </p:spPr>
+        <p:style>
+          <a:lnRef idx="2">
+            <a:schemeClr val="accent3">
+              <a:shade val="50000"/>
+            </a:schemeClr>
+          </a:lnRef>
+          <a:fillRef idx="1">
+            <a:schemeClr val="accent3"/>
+          </a:fillRef>
+          <a:effectRef idx="0">
+            <a:schemeClr val="accent3"/>
+          </a:effectRef>
+          <a:fontRef idx="minor">
+            <a:schemeClr val="lt1"/>
+          </a:fontRef>
+        </p:style>
+        <p:txBody>
+          <a:bodyPr rtlCol="0" anchor="ctr"/>
+          <a:lstStyle/>
+          <a:p>
+            <a:pPr algn="ctr"/>
+            <a:r>
+              <a:rPr lang="de-CH" sz="1000" dirty="0" err="1" smtClean="0">
+                <a:solidFill>
+                  <a:schemeClr val="tx1"/>
+                </a:solidFill>
+              </a:rPr>
+              <a:t>Accept</a:t>
+            </a:r>
+            <a:endParaRPr lang="de-CH" sz="1000" dirty="0">
+              <a:solidFill>
+                <a:schemeClr val="tx1"/>
+              </a:solidFill>
+            </a:endParaRPr>
+          </a:p>
+        </p:txBody>
+      </p:sp>
+      <p:sp>
+        <p:nvSpPr>
+          <p:cNvPr id="44" name="Abgerundetes Rechteck 43"/>
+          <p:cNvSpPr/>
+          <p:nvPr/>
+        </p:nvSpPr>
+        <p:spPr>
+          <a:xfrm>
+            <a:off x="7665007" y="5520152"/>
+            <a:ext cx="797796" cy="171834"/>
+          </a:xfrm>
+          <a:prstGeom prst="roundRect">
+            <a:avLst/>
+          </a:prstGeom>
+          <a:solidFill>
+            <a:schemeClr val="accent4">
+              <a:lumMod val="40000"/>
+              <a:lumOff val="60000"/>
+            </a:schemeClr>
+          </a:solidFill>
+        </p:spPr>
+        <p:style>
+          <a:lnRef idx="2">
+            <a:schemeClr val="accent3">
+              <a:shade val="50000"/>
+            </a:schemeClr>
+          </a:lnRef>
+          <a:fillRef idx="1">
+            <a:schemeClr val="accent3"/>
+          </a:fillRef>
+          <a:effectRef idx="0">
+            <a:schemeClr val="accent3"/>
+          </a:effectRef>
+          <a:fontRef idx="minor">
+            <a:schemeClr val="lt1"/>
+          </a:fontRef>
+        </p:style>
+        <p:txBody>
+          <a:bodyPr rtlCol="0" anchor="ctr"/>
+          <a:lstStyle/>
+          <a:p>
+            <a:pPr algn="ctr"/>
+            <a:r>
+              <a:rPr lang="de-CH" sz="1000" dirty="0" smtClean="0">
+                <a:solidFill>
+                  <a:schemeClr val="tx1"/>
+                </a:solidFill>
+              </a:rPr>
+              <a:t>Fonts…</a:t>
+            </a:r>
+            <a:endParaRPr lang="de-CH" sz="1000" dirty="0">
+              <a:solidFill>
+                <a:schemeClr val="tx1"/>
+              </a:solidFill>
+            </a:endParaRPr>
+          </a:p>
+        </p:txBody>
+      </p:sp>
+      <p:sp>
+        <p:nvSpPr>
+          <p:cNvPr id="45" name="Abgerundetes Rechteck 44"/>
+          <p:cNvSpPr/>
+          <p:nvPr/>
+        </p:nvSpPr>
+        <p:spPr>
+          <a:xfrm>
+            <a:off x="7665007" y="5753355"/>
+            <a:ext cx="797796" cy="171834"/>
+          </a:xfrm>
+          <a:prstGeom prst="roundRect">
+            <a:avLst/>
+          </a:prstGeom>
+          <a:solidFill>
+            <a:schemeClr val="accent4">
+              <a:lumMod val="40000"/>
+              <a:lumOff val="60000"/>
+            </a:schemeClr>
+          </a:solidFill>
+        </p:spPr>
+        <p:style>
+          <a:lnRef idx="2">
+            <a:schemeClr val="accent3">
+              <a:shade val="50000"/>
+            </a:schemeClr>
+          </a:lnRef>
+          <a:fillRef idx="1">
+            <a:schemeClr val="accent3"/>
+          </a:fillRef>
+          <a:effectRef idx="0">
+            <a:schemeClr val="accent3"/>
+          </a:effectRef>
+          <a:fontRef idx="minor">
+            <a:schemeClr val="lt1"/>
+          </a:fontRef>
+        </p:style>
+        <p:txBody>
+          <a:bodyPr rtlCol="0" anchor="ctr"/>
+          <a:lstStyle/>
+          <a:p>
+            <a:pPr algn="ctr"/>
+            <a:r>
+              <a:rPr lang="de-CH" sz="1000" dirty="0" smtClean="0">
+                <a:solidFill>
+                  <a:schemeClr val="tx1"/>
+                </a:solidFill>
+              </a:rPr>
+              <a:t>Colors…</a:t>
+            </a:r>
+            <a:endParaRPr lang="de-CH" sz="1000" dirty="0">
+              <a:solidFill>
+                <a:schemeClr val="tx1"/>
+              </a:solidFill>
+            </a:endParaRPr>
+          </a:p>
+        </p:txBody>
+      </p:sp>
+    </p:spTree>
+    <p:extLst>
+      <p:ext uri="{BB962C8B-B14F-4D97-AF65-F5344CB8AC3E}">
+        <p14:creationId xmlns:p14="http://schemas.microsoft.com/office/powerpoint/2010/main" val="3387693444"/>
+      </p:ext>
+    </p:extLst>
+  </p:cSld>
+  <p:clrMapOvr>
+    <a:masterClrMapping/>
+  </p:clrMapOvr>
+</p:sld>
+</file>
+
 <file path=ppt/theme/theme1.xml><?xml version="1.0" encoding="utf-8"?>
 <a:theme xmlns:a="http://schemas.openxmlformats.org/drawingml/2006/main" name="Office Theme">
   <a:themeElements>

</xml_diff>